<commit_message>
Add PDFs for week4, nits
</commit_message>
<xml_diff>
--- a/Slides/Lesson 4.2 Asynchronous Programming.pptx
+++ b/Slides/Lesson 4.2 Asynchronous Programming.pptx
@@ -3183,7 +3183,7 @@
           <a:p>
             <a:fld id="{5D2A64DE-480B-420F-9649-4F8E696E08E0}" type="datetime1">
               <a:rPr lang="en-US" smtClean="0"/>
-              <a:t>2/5/22</a:t>
+              <a:t>2/6/22</a:t>
             </a:fld>
             <a:endParaRPr lang="en-US"/>
           </a:p>
@@ -3437,7 +3437,7 @@
           <a:p>
             <a:fld id="{07C7BFD4-467E-4EDE-93EA-052F5B39A4E5}" type="datetime1">
               <a:rPr lang="en-US" smtClean="0"/>
-              <a:t>2/5/22</a:t>
+              <a:t>2/6/22</a:t>
             </a:fld>
             <a:endParaRPr lang="en-US"/>
           </a:p>
@@ -5614,7 +5614,7 @@
           <a:p>
             <a:fld id="{07C7BFD4-467E-4EDE-93EA-052F5B39A4E5}" type="datetime1">
               <a:rPr lang="en-US" smtClean="0"/>
-              <a:t>2/5/22</a:t>
+              <a:t>2/6/22</a:t>
             </a:fld>
             <a:endParaRPr lang="en-US"/>
           </a:p>
@@ -8206,7 +8206,7 @@
           <a:p>
             <a:fld id="{5D2A64DE-480B-420F-9649-4F8E696E08E0}" type="datetime1">
               <a:rPr lang="en-US" smtClean="0"/>
-              <a:t>2/5/22</a:t>
+              <a:t>2/6/22</a:t>
             </a:fld>
             <a:endParaRPr lang="en-US"/>
           </a:p>
@@ -8460,7 +8460,7 @@
           <a:p>
             <a:fld id="{07C7BFD4-467E-4EDE-93EA-052F5B39A4E5}" type="datetime1">
               <a:rPr lang="en-US" smtClean="0"/>
-              <a:t>2/5/22</a:t>
+              <a:t>2/6/22</a:t>
             </a:fld>
             <a:endParaRPr lang="en-US"/>
           </a:p>
@@ -10715,7 +10715,7 @@
           <a:p>
             <a:fld id="{07C7BFD4-467E-4EDE-93EA-052F5B39A4E5}" type="datetime1">
               <a:rPr lang="en-US" smtClean="0"/>
-              <a:t>2/5/22</a:t>
+              <a:t>2/6/22</a:t>
             </a:fld>
             <a:endParaRPr lang="en-US"/>
           </a:p>
@@ -11614,7 +11614,7 @@
           </a:ln>
           <a:extLst>
             <a:ext uri="{C572A759-6A51-4108-AA02-DFA0A04FC94B}">
-              <ma14:wrappingTextBoxFlag xmlns="" xmlns:m="http://schemas.openxmlformats.org/officeDocument/2006/math" xmlns:a14="http://schemas.microsoft.com/office/drawing/2010/main" xmlns:ma14="http://schemas.microsoft.com/office/mac/drawingml/2011/main" val="1"/>
+              <ma14:wrappingTextBoxFlag xmlns:ma14="http://schemas.microsoft.com/office/mac/drawingml/2011/main" xmlns:a14="http://schemas.microsoft.com/office/drawing/2010/main" xmlns:m="http://schemas.openxmlformats.org/officeDocument/2006/math" xmlns="" val="1"/>
             </a:ext>
           </a:extLst>
         </p:spPr>
@@ -11654,7 +11654,7 @@
           </a:ln>
           <a:extLst>
             <a:ext uri="{C572A759-6A51-4108-AA02-DFA0A04FC94B}">
-              <ma14:wrappingTextBoxFlag xmlns="" xmlns:m="http://schemas.openxmlformats.org/officeDocument/2006/math" xmlns:a14="http://schemas.microsoft.com/office/drawing/2010/main" xmlns:ma14="http://schemas.microsoft.com/office/mac/drawingml/2011/main" val="1"/>
+              <ma14:wrappingTextBoxFlag xmlns:ma14="http://schemas.microsoft.com/office/mac/drawingml/2011/main" xmlns:a14="http://schemas.microsoft.com/office/drawing/2010/main" xmlns:m="http://schemas.openxmlformats.org/officeDocument/2006/math" xmlns="" val="1"/>
             </a:ext>
           </a:extLst>
         </p:spPr>
@@ -12521,7 +12521,7 @@
           </a:ln>
           <a:extLst>
             <a:ext uri="{C572A759-6A51-4108-AA02-DFA0A04FC94B}">
-              <ma14:wrappingTextBoxFlag xmlns:ma14="http://schemas.microsoft.com/office/mac/drawingml/2011/main" xmlns:a14="http://schemas.microsoft.com/office/drawing/2010/main" xmlns:m="http://schemas.openxmlformats.org/officeDocument/2006/math" xmlns="" val="1"/>
+              <ma14:wrappingTextBoxFlag xmlns="" xmlns:m="http://schemas.openxmlformats.org/officeDocument/2006/math" xmlns:a14="http://schemas.microsoft.com/office/drawing/2010/main" xmlns:ma14="http://schemas.microsoft.com/office/mac/drawingml/2011/main" val="1"/>
             </a:ext>
           </a:extLst>
         </p:spPr>
@@ -12561,7 +12561,7 @@
           </a:ln>
           <a:extLst>
             <a:ext uri="{C572A759-6A51-4108-AA02-DFA0A04FC94B}">
-              <ma14:wrappingTextBoxFlag xmlns:ma14="http://schemas.microsoft.com/office/mac/drawingml/2011/main" xmlns:a14="http://schemas.microsoft.com/office/drawing/2010/main" xmlns:m="http://schemas.openxmlformats.org/officeDocument/2006/math" xmlns="" val="1"/>
+              <ma14:wrappingTextBoxFlag xmlns="" xmlns:m="http://schemas.openxmlformats.org/officeDocument/2006/math" xmlns:a14="http://schemas.microsoft.com/office/drawing/2010/main" xmlns:ma14="http://schemas.microsoft.com/office/mac/drawingml/2011/main" val="1"/>
             </a:ext>
           </a:extLst>
         </p:spPr>
@@ -13709,7 +13709,7 @@
           </a:ln>
           <a:extLst>
             <a:ext uri="{C572A759-6A51-4108-AA02-DFA0A04FC94B}">
-              <ma14:wrappingTextBoxFlag xmlns:ma14="http://schemas.microsoft.com/office/mac/drawingml/2011/main" xmlns:a14="http://schemas.microsoft.com/office/drawing/2010/main" xmlns:m="http://schemas.openxmlformats.org/officeDocument/2006/math" xmlns="" val="1"/>
+              <ma14:wrappingTextBoxFlag xmlns="" xmlns:m="http://schemas.openxmlformats.org/officeDocument/2006/math" xmlns:a14="http://schemas.microsoft.com/office/drawing/2010/main" xmlns:ma14="http://schemas.microsoft.com/office/mac/drawingml/2011/main" val="1"/>
             </a:ext>
           </a:extLst>
         </p:spPr>
@@ -14479,7 +14479,7 @@
             <a:effectLst/>
             <a:extLst>
               <a:ext uri="{C572A759-6A51-4108-AA02-DFA0A04FC94B}">
-                <ma14:wrappingTextBoxFlag xmlns:ma14="http://schemas.microsoft.com/office/mac/drawingml/2011/main" xmlns:a14="http://schemas.microsoft.com/office/drawing/2010/main" xmlns:m="http://schemas.openxmlformats.org/officeDocument/2006/math" xmlns="" val="1"/>
+                <ma14:wrappingTextBoxFlag xmlns="" xmlns:m="http://schemas.openxmlformats.org/officeDocument/2006/math" xmlns:a14="http://schemas.microsoft.com/office/drawing/2010/main" xmlns:ma14="http://schemas.microsoft.com/office/mac/drawingml/2011/main" val="1"/>
               </a:ext>
             </a:extLst>
           </p:spPr>
@@ -14524,7 +14524,7 @@
             <a:effectLst/>
             <a:extLst>
               <a:ext uri="{C572A759-6A51-4108-AA02-DFA0A04FC94B}">
-                <ma14:wrappingTextBoxFlag xmlns:ma14="http://schemas.microsoft.com/office/mac/drawingml/2011/main" xmlns:a14="http://schemas.microsoft.com/office/drawing/2010/main" xmlns:m="http://schemas.openxmlformats.org/officeDocument/2006/math" xmlns="" val="1"/>
+                <ma14:wrappingTextBoxFlag xmlns="" xmlns:m="http://schemas.openxmlformats.org/officeDocument/2006/math" xmlns:a14="http://schemas.microsoft.com/office/drawing/2010/main" xmlns:ma14="http://schemas.microsoft.com/office/mac/drawingml/2011/main" val="1"/>
               </a:ext>
             </a:extLst>
           </p:spPr>
@@ -14584,7 +14584,7 @@
             <a:effectLst/>
             <a:extLst>
               <a:ext uri="{C572A759-6A51-4108-AA02-DFA0A04FC94B}">
-                <ma14:wrappingTextBoxFlag xmlns:ma14="http://schemas.microsoft.com/office/mac/drawingml/2011/main" xmlns:a14="http://schemas.microsoft.com/office/drawing/2010/main" xmlns:m="http://schemas.openxmlformats.org/officeDocument/2006/math" xmlns="" val="1"/>
+                <ma14:wrappingTextBoxFlag xmlns="" xmlns:m="http://schemas.openxmlformats.org/officeDocument/2006/math" xmlns:a14="http://schemas.microsoft.com/office/drawing/2010/main" xmlns:ma14="http://schemas.microsoft.com/office/mac/drawingml/2011/main" val="1"/>
               </a:ext>
             </a:extLst>
           </p:spPr>
@@ -14846,7 +14846,7 @@
             <a:effectLst/>
             <a:extLst>
               <a:ext uri="{C572A759-6A51-4108-AA02-DFA0A04FC94B}">
-                <ma14:wrappingTextBoxFlag xmlns:ma14="http://schemas.microsoft.com/office/mac/drawingml/2011/main" xmlns:a14="http://schemas.microsoft.com/office/drawing/2010/main" xmlns:m="http://schemas.openxmlformats.org/officeDocument/2006/math" xmlns="" val="1"/>
+                <ma14:wrappingTextBoxFlag xmlns="" xmlns:m="http://schemas.openxmlformats.org/officeDocument/2006/math" xmlns:a14="http://schemas.microsoft.com/office/drawing/2010/main" xmlns:ma14="http://schemas.microsoft.com/office/mac/drawingml/2011/main" val="1"/>
               </a:ext>
             </a:extLst>
           </p:spPr>
@@ -15112,7 +15112,7 @@
               <a:effectLst/>
               <a:extLst>
                 <a:ext uri="{C572A759-6A51-4108-AA02-DFA0A04FC94B}">
-                  <ma14:wrappingTextBoxFlag xmlns:ma14="http://schemas.microsoft.com/office/mac/drawingml/2011/main" xmlns:a14="http://schemas.microsoft.com/office/drawing/2010/main" xmlns:m="http://schemas.openxmlformats.org/officeDocument/2006/math" xmlns="" val="1"/>
+                  <ma14:wrappingTextBoxFlag xmlns="" xmlns:m="http://schemas.openxmlformats.org/officeDocument/2006/math" xmlns:a14="http://schemas.microsoft.com/office/drawing/2010/main" xmlns:ma14="http://schemas.microsoft.com/office/mac/drawingml/2011/main" val="1"/>
                 </a:ext>
               </a:extLst>
             </p:spPr>
@@ -15676,7 +15676,7 @@
             <a:effectLst/>
             <a:extLst>
               <a:ext uri="{C572A759-6A51-4108-AA02-DFA0A04FC94B}">
-                <ma14:wrappingTextBoxFlag xmlns:ma14="http://schemas.microsoft.com/office/mac/drawingml/2011/main" xmlns:a14="http://schemas.microsoft.com/office/drawing/2010/main" xmlns:m="http://schemas.openxmlformats.org/officeDocument/2006/math" xmlns="" val="1"/>
+                <ma14:wrappingTextBoxFlag xmlns="" xmlns:m="http://schemas.openxmlformats.org/officeDocument/2006/math" xmlns:a14="http://schemas.microsoft.com/office/drawing/2010/main" xmlns:ma14="http://schemas.microsoft.com/office/mac/drawingml/2011/main" val="1"/>
               </a:ext>
             </a:extLst>
           </p:spPr>
@@ -16960,7 +16960,7 @@
           </a:prstGeom>
           <a:extLst>
             <a:ext uri="{C572A759-6A51-4108-AA02-DFA0A04FC94B}">
-              <ma14:wrappingTextBoxFlag xmlns:ma14="http://schemas.microsoft.com/office/mac/drawingml/2011/main" xmlns:a14="http://schemas.microsoft.com/office/drawing/2010/main" xmlns:m="http://schemas.openxmlformats.org/officeDocument/2006/math" xmlns="" val="1"/>
+              <ma14:wrappingTextBoxFlag xmlns="" xmlns:m="http://schemas.openxmlformats.org/officeDocument/2006/math" xmlns:a14="http://schemas.microsoft.com/office/drawing/2010/main" xmlns:ma14="http://schemas.microsoft.com/office/mac/drawingml/2011/main" val="1"/>
             </a:ext>
           </a:extLst>
         </p:spPr>
@@ -17001,7 +17001,7 @@
           </a:ln>
           <a:extLst>
             <a:ext uri="{C572A759-6A51-4108-AA02-DFA0A04FC94B}">
-              <ma14:wrappingTextBoxFlag xmlns:ma14="http://schemas.microsoft.com/office/mac/drawingml/2011/main" xmlns:a14="http://schemas.microsoft.com/office/drawing/2010/main" xmlns:m="http://schemas.openxmlformats.org/officeDocument/2006/math" xmlns="" val="1"/>
+              <ma14:wrappingTextBoxFlag xmlns="" xmlns:m="http://schemas.openxmlformats.org/officeDocument/2006/math" xmlns:a14="http://schemas.microsoft.com/office/drawing/2010/main" xmlns:ma14="http://schemas.microsoft.com/office/mac/drawingml/2011/main" val="1"/>
             </a:ext>
           </a:extLst>
         </p:spPr>
@@ -18195,7 +18195,7 @@
           </a:ln>
           <a:extLst>
             <a:ext uri="{C572A759-6A51-4108-AA02-DFA0A04FC94B}">
-              <ma14:wrappingTextBoxFlag xmlns:ma14="http://schemas.microsoft.com/office/mac/drawingml/2011/main" xmlns:a14="http://schemas.microsoft.com/office/drawing/2010/main" xmlns:m="http://schemas.openxmlformats.org/officeDocument/2006/math" xmlns="" val="1"/>
+              <ma14:wrappingTextBoxFlag xmlns="" xmlns:m="http://schemas.openxmlformats.org/officeDocument/2006/math" xmlns:a14="http://schemas.microsoft.com/office/drawing/2010/main" xmlns:ma14="http://schemas.microsoft.com/office/mac/drawingml/2011/main" val="1"/>
             </a:ext>
           </a:extLst>
         </p:spPr>
@@ -18383,7 +18383,7 @@
           </a:ln>
           <a:extLst>
             <a:ext uri="{C572A759-6A51-4108-AA02-DFA0A04FC94B}">
-              <ma14:wrappingTextBoxFlag xmlns:ma14="http://schemas.microsoft.com/office/mac/drawingml/2011/main" xmlns:a14="http://schemas.microsoft.com/office/drawing/2010/main" xmlns:m="http://schemas.openxmlformats.org/officeDocument/2006/math" xmlns="" val="1"/>
+              <ma14:wrappingTextBoxFlag xmlns="" xmlns:m="http://schemas.openxmlformats.org/officeDocument/2006/math" xmlns:a14="http://schemas.microsoft.com/office/drawing/2010/main" xmlns:ma14="http://schemas.microsoft.com/office/mac/drawingml/2011/main" val="1"/>
             </a:ext>
           </a:extLst>
         </p:spPr>
@@ -18592,7 +18592,7 @@
             <a:effectLst/>
             <a:extLst>
               <a:ext uri="{C572A759-6A51-4108-AA02-DFA0A04FC94B}">
-                <ma14:wrappingTextBoxFlag xmlns:ma14="http://schemas.microsoft.com/office/mac/drawingml/2011/main" xmlns:a14="http://schemas.microsoft.com/office/drawing/2010/main" xmlns:m="http://schemas.openxmlformats.org/officeDocument/2006/math" xmlns="" val="1"/>
+                <ma14:wrappingTextBoxFlag xmlns="" xmlns:m="http://schemas.openxmlformats.org/officeDocument/2006/math" xmlns:a14="http://schemas.microsoft.com/office/drawing/2010/main" xmlns:ma14="http://schemas.microsoft.com/office/mac/drawingml/2011/main" val="1"/>
               </a:ext>
             </a:extLst>
           </p:spPr>
@@ -18761,7 +18761,7 @@
             <a:effectLst/>
             <a:extLst>
               <a:ext uri="{C572A759-6A51-4108-AA02-DFA0A04FC94B}">
-                <ma14:wrappingTextBoxFlag xmlns:ma14="http://schemas.microsoft.com/office/mac/drawingml/2011/main" xmlns:a14="http://schemas.microsoft.com/office/drawing/2010/main" xmlns:m="http://schemas.openxmlformats.org/officeDocument/2006/math" xmlns="" val="1"/>
+                <ma14:wrappingTextBoxFlag xmlns="" xmlns:m="http://schemas.openxmlformats.org/officeDocument/2006/math" xmlns:a14="http://schemas.microsoft.com/office/drawing/2010/main" xmlns:ma14="http://schemas.microsoft.com/office/mac/drawingml/2011/main" val="1"/>
               </a:ext>
             </a:extLst>
           </p:spPr>
@@ -18930,7 +18930,7 @@
             <a:effectLst/>
             <a:extLst>
               <a:ext uri="{C572A759-6A51-4108-AA02-DFA0A04FC94B}">
-                <ma14:wrappingTextBoxFlag xmlns:ma14="http://schemas.microsoft.com/office/mac/drawingml/2011/main" xmlns:a14="http://schemas.microsoft.com/office/drawing/2010/main" xmlns:m="http://schemas.openxmlformats.org/officeDocument/2006/math" xmlns="" val="1"/>
+                <ma14:wrappingTextBoxFlag xmlns="" xmlns:m="http://schemas.openxmlformats.org/officeDocument/2006/math" xmlns:a14="http://schemas.microsoft.com/office/drawing/2010/main" xmlns:ma14="http://schemas.microsoft.com/office/mac/drawingml/2011/main" val="1"/>
               </a:ext>
             </a:extLst>
           </p:spPr>
@@ -19107,7 +19107,7 @@
             <a:effectLst/>
             <a:extLst>
               <a:ext uri="{C572A759-6A51-4108-AA02-DFA0A04FC94B}">
-                <ma14:wrappingTextBoxFlag xmlns:ma14="http://schemas.microsoft.com/office/mac/drawingml/2011/main" xmlns:a14="http://schemas.microsoft.com/office/drawing/2010/main" xmlns:m="http://schemas.openxmlformats.org/officeDocument/2006/math" xmlns="" val="1"/>
+                <ma14:wrappingTextBoxFlag xmlns="" xmlns:m="http://schemas.openxmlformats.org/officeDocument/2006/math" xmlns:a14="http://schemas.microsoft.com/office/drawing/2010/main" xmlns:ma14="http://schemas.microsoft.com/office/mac/drawingml/2011/main" val="1"/>
               </a:ext>
             </a:extLst>
           </p:spPr>
@@ -19259,7 +19259,7 @@
           </a:ln>
           <a:extLst>
             <a:ext uri="{C572A759-6A51-4108-AA02-DFA0A04FC94B}">
-              <ma14:wrappingTextBoxFlag xmlns:ma14="http://schemas.microsoft.com/office/mac/drawingml/2011/main" xmlns:a14="http://schemas.microsoft.com/office/drawing/2010/main" xmlns:m="http://schemas.openxmlformats.org/officeDocument/2006/math" xmlns="" val="1"/>
+              <ma14:wrappingTextBoxFlag xmlns="" xmlns:m="http://schemas.openxmlformats.org/officeDocument/2006/math" xmlns:a14="http://schemas.microsoft.com/office/drawing/2010/main" xmlns:ma14="http://schemas.microsoft.com/office/mac/drawingml/2011/main" val="1"/>
             </a:ext>
           </a:extLst>
         </p:spPr>
@@ -19457,7 +19457,7 @@
           </a:ln>
           <a:extLst>
             <a:ext uri="{C572A759-6A51-4108-AA02-DFA0A04FC94B}">
-              <ma14:wrappingTextBoxFlag xmlns:ma14="http://schemas.microsoft.com/office/mac/drawingml/2011/main" xmlns:a14="http://schemas.microsoft.com/office/drawing/2010/main" xmlns:m="http://schemas.openxmlformats.org/officeDocument/2006/math" xmlns="" val="1"/>
+              <ma14:wrappingTextBoxFlag xmlns="" xmlns:m="http://schemas.openxmlformats.org/officeDocument/2006/math" xmlns:a14="http://schemas.microsoft.com/office/drawing/2010/main" xmlns:ma14="http://schemas.microsoft.com/office/mac/drawingml/2011/main" val="1"/>
             </a:ext>
           </a:extLst>
         </p:spPr>
@@ -20471,7 +20471,7 @@
           </a:prstGeom>
           <a:extLst>
             <a:ext uri="{C572A759-6A51-4108-AA02-DFA0A04FC94B}">
-              <ma14:wrappingTextBoxFlag xmlns:ma14="http://schemas.microsoft.com/office/mac/drawingml/2011/main" xmlns:a14="http://schemas.microsoft.com/office/drawing/2010/main" xmlns:m="http://schemas.openxmlformats.org/officeDocument/2006/math" xmlns="" val="1"/>
+              <ma14:wrappingTextBoxFlag xmlns="" xmlns:m="http://schemas.openxmlformats.org/officeDocument/2006/math" xmlns:a14="http://schemas.microsoft.com/office/drawing/2010/main" xmlns:ma14="http://schemas.microsoft.com/office/mac/drawingml/2011/main" val="1"/>
             </a:ext>
           </a:extLst>
         </p:spPr>
@@ -20512,7 +20512,7 @@
           </a:ln>
           <a:extLst>
             <a:ext uri="{C572A759-6A51-4108-AA02-DFA0A04FC94B}">
-              <ma14:wrappingTextBoxFlag xmlns:ma14="http://schemas.microsoft.com/office/mac/drawingml/2011/main" xmlns:a14="http://schemas.microsoft.com/office/drawing/2010/main" xmlns:m="http://schemas.openxmlformats.org/officeDocument/2006/math" xmlns="" val="1"/>
+              <ma14:wrappingTextBoxFlag xmlns="" xmlns:m="http://schemas.openxmlformats.org/officeDocument/2006/math" xmlns:a14="http://schemas.microsoft.com/office/drawing/2010/main" xmlns:ma14="http://schemas.microsoft.com/office/mac/drawingml/2011/main" val="1"/>
             </a:ext>
           </a:extLst>
         </p:spPr>
@@ -20638,7 +20638,7 @@
           </a:ln>
           <a:extLst>
             <a:ext uri="{C572A759-6A51-4108-AA02-DFA0A04FC94B}">
-              <ma14:wrappingTextBoxFlag xmlns:ma14="http://schemas.microsoft.com/office/mac/drawingml/2011/main" xmlns:a14="http://schemas.microsoft.com/office/drawing/2010/main" xmlns:m="http://schemas.openxmlformats.org/officeDocument/2006/math" xmlns="" val="1"/>
+              <ma14:wrappingTextBoxFlag xmlns="" xmlns:m="http://schemas.openxmlformats.org/officeDocument/2006/math" xmlns:a14="http://schemas.microsoft.com/office/drawing/2010/main" xmlns:ma14="http://schemas.microsoft.com/office/mac/drawingml/2011/main" val="1"/>
             </a:ext>
           </a:extLst>
         </p:spPr>
@@ -21264,7 +21264,7 @@
             <a:effectLst/>
             <a:extLst>
               <a:ext uri="{C572A759-6A51-4108-AA02-DFA0A04FC94B}">
-                <ma14:wrappingTextBoxFlag xmlns:ma14="http://schemas.microsoft.com/office/mac/drawingml/2011/main" xmlns:a14="http://schemas.microsoft.com/office/drawing/2010/main" xmlns:m="http://schemas.openxmlformats.org/officeDocument/2006/math" xmlns="" val="1"/>
+                <ma14:wrappingTextBoxFlag xmlns="" xmlns:m="http://schemas.openxmlformats.org/officeDocument/2006/math" xmlns:a14="http://schemas.microsoft.com/office/drawing/2010/main" xmlns:ma14="http://schemas.microsoft.com/office/mac/drawingml/2011/main" val="1"/>
               </a:ext>
             </a:extLst>
           </p:spPr>
@@ -21469,7 +21469,7 @@
             <a:effectLst/>
             <a:extLst>
               <a:ext uri="{C572A759-6A51-4108-AA02-DFA0A04FC94B}">
-                <ma14:wrappingTextBoxFlag xmlns:ma14="http://schemas.microsoft.com/office/mac/drawingml/2011/main" xmlns:a14="http://schemas.microsoft.com/office/drawing/2010/main" xmlns:m="http://schemas.openxmlformats.org/officeDocument/2006/math" xmlns="" val="1"/>
+                <ma14:wrappingTextBoxFlag xmlns="" xmlns:m="http://schemas.openxmlformats.org/officeDocument/2006/math" xmlns:a14="http://schemas.microsoft.com/office/drawing/2010/main" xmlns:ma14="http://schemas.microsoft.com/office/mac/drawingml/2011/main" val="1"/>
               </a:ext>
             </a:extLst>
           </p:spPr>
@@ -21680,7 +21680,7 @@
             <a:effectLst/>
             <a:extLst>
               <a:ext uri="{C572A759-6A51-4108-AA02-DFA0A04FC94B}">
-                <ma14:wrappingTextBoxFlag xmlns:ma14="http://schemas.microsoft.com/office/mac/drawingml/2011/main" xmlns:a14="http://schemas.microsoft.com/office/drawing/2010/main" xmlns:m="http://schemas.openxmlformats.org/officeDocument/2006/math" xmlns="" val="1"/>
+                <ma14:wrappingTextBoxFlag xmlns="" xmlns:m="http://schemas.openxmlformats.org/officeDocument/2006/math" xmlns:a14="http://schemas.microsoft.com/office/drawing/2010/main" xmlns:ma14="http://schemas.microsoft.com/office/mac/drawingml/2011/main" val="1"/>
               </a:ext>
             </a:extLst>
           </p:spPr>
@@ -22101,7 +22101,7 @@
           </a:prstGeom>
           <a:extLst>
             <a:ext uri="{C572A759-6A51-4108-AA02-DFA0A04FC94B}">
-              <ma14:wrappingTextBoxFlag xmlns:ma14="http://schemas.microsoft.com/office/mac/drawingml/2011/main" xmlns:a14="http://schemas.microsoft.com/office/drawing/2010/main" xmlns:m="http://schemas.openxmlformats.org/officeDocument/2006/math" xmlns="" val="1"/>
+              <ma14:wrappingTextBoxFlag xmlns="" xmlns:m="http://schemas.openxmlformats.org/officeDocument/2006/math" xmlns:a14="http://schemas.microsoft.com/office/drawing/2010/main" xmlns:ma14="http://schemas.microsoft.com/office/mac/drawingml/2011/main" val="1"/>
             </a:ext>
           </a:extLst>
         </p:spPr>
@@ -22137,7 +22137,7 @@
           </a:ln>
           <a:extLst>
             <a:ext uri="{C572A759-6A51-4108-AA02-DFA0A04FC94B}">
-              <ma14:wrappingTextBoxFlag xmlns:ma14="http://schemas.microsoft.com/office/mac/drawingml/2011/main" xmlns:a14="http://schemas.microsoft.com/office/drawing/2010/main" xmlns:m="http://schemas.openxmlformats.org/officeDocument/2006/math" xmlns="" val="1"/>
+              <ma14:wrappingTextBoxFlag xmlns="" xmlns:m="http://schemas.openxmlformats.org/officeDocument/2006/math" xmlns:a14="http://schemas.microsoft.com/office/drawing/2010/main" xmlns:ma14="http://schemas.microsoft.com/office/mac/drawingml/2011/main" val="1"/>
             </a:ext>
           </a:extLst>
         </p:spPr>
@@ -22253,7 +22253,7 @@
           </a:ln>
           <a:extLst>
             <a:ext uri="{C572A759-6A51-4108-AA02-DFA0A04FC94B}">
-              <ma14:wrappingTextBoxFlag xmlns:ma14="http://schemas.microsoft.com/office/mac/drawingml/2011/main" xmlns:a14="http://schemas.microsoft.com/office/drawing/2010/main" xmlns:m="http://schemas.openxmlformats.org/officeDocument/2006/math" xmlns="" val="1"/>
+              <ma14:wrappingTextBoxFlag xmlns="" xmlns:m="http://schemas.openxmlformats.org/officeDocument/2006/math" xmlns:a14="http://schemas.microsoft.com/office/drawing/2010/main" xmlns:ma14="http://schemas.microsoft.com/office/mac/drawingml/2011/main" val="1"/>
             </a:ext>
           </a:extLst>
         </p:spPr>
@@ -23036,7 +23036,7 @@
             <a:effectLst/>
             <a:extLst>
               <a:ext uri="{C572A759-6A51-4108-AA02-DFA0A04FC94B}">
-                <ma14:wrappingTextBoxFlag xmlns:ma14="http://schemas.microsoft.com/office/mac/drawingml/2011/main" xmlns:a14="http://schemas.microsoft.com/office/drawing/2010/main" xmlns:m="http://schemas.openxmlformats.org/officeDocument/2006/math" xmlns="" val="1"/>
+                <ma14:wrappingTextBoxFlag xmlns="" xmlns:m="http://schemas.openxmlformats.org/officeDocument/2006/math" xmlns:a14="http://schemas.microsoft.com/office/drawing/2010/main" xmlns:ma14="http://schemas.microsoft.com/office/mac/drawingml/2011/main" val="1"/>
               </a:ext>
             </a:extLst>
           </p:spPr>
@@ -23306,7 +23306,7 @@
             <a:effectLst/>
             <a:extLst>
               <a:ext uri="{C572A759-6A51-4108-AA02-DFA0A04FC94B}">
-                <ma14:wrappingTextBoxFlag xmlns:ma14="http://schemas.microsoft.com/office/mac/drawingml/2011/main" xmlns:a14="http://schemas.microsoft.com/office/drawing/2010/main" xmlns:m="http://schemas.openxmlformats.org/officeDocument/2006/math" xmlns="" val="1"/>
+                <ma14:wrappingTextBoxFlag xmlns="" xmlns:m="http://schemas.openxmlformats.org/officeDocument/2006/math" xmlns:a14="http://schemas.microsoft.com/office/drawing/2010/main" xmlns:ma14="http://schemas.microsoft.com/office/mac/drawingml/2011/main" val="1"/>
               </a:ext>
             </a:extLst>
           </p:spPr>
@@ -23715,7 +23715,7 @@
           </a:prstGeom>
           <a:extLst>
             <a:ext uri="{C572A759-6A51-4108-AA02-DFA0A04FC94B}">
-              <ma14:wrappingTextBoxFlag xmlns:ma14="http://schemas.microsoft.com/office/mac/drawingml/2011/main" xmlns:a14="http://schemas.microsoft.com/office/drawing/2010/main" xmlns:m="http://schemas.openxmlformats.org/officeDocument/2006/math" xmlns="" val="1"/>
+              <ma14:wrappingTextBoxFlag xmlns="" xmlns:m="http://schemas.openxmlformats.org/officeDocument/2006/math" xmlns:a14="http://schemas.microsoft.com/office/drawing/2010/main" xmlns:ma14="http://schemas.microsoft.com/office/mac/drawingml/2011/main" val="1"/>
             </a:ext>
           </a:extLst>
         </p:spPr>
@@ -23751,7 +23751,7 @@
           </a:ln>
           <a:extLst>
             <a:ext uri="{C572A759-6A51-4108-AA02-DFA0A04FC94B}">
-              <ma14:wrappingTextBoxFlag xmlns:ma14="http://schemas.microsoft.com/office/mac/drawingml/2011/main" xmlns:a14="http://schemas.microsoft.com/office/drawing/2010/main" xmlns:m="http://schemas.openxmlformats.org/officeDocument/2006/math" xmlns="" val="1"/>
+              <ma14:wrappingTextBoxFlag xmlns="" xmlns:m="http://schemas.openxmlformats.org/officeDocument/2006/math" xmlns:a14="http://schemas.microsoft.com/office/drawing/2010/main" xmlns:ma14="http://schemas.microsoft.com/office/mac/drawingml/2011/main" val="1"/>
             </a:ext>
           </a:extLst>
         </p:spPr>
@@ -23865,7 +23865,7 @@
           </a:ln>
           <a:extLst>
             <a:ext uri="{C572A759-6A51-4108-AA02-DFA0A04FC94B}">
-              <ma14:wrappingTextBoxFlag xmlns:ma14="http://schemas.microsoft.com/office/mac/drawingml/2011/main" xmlns:a14="http://schemas.microsoft.com/office/drawing/2010/main" xmlns:m="http://schemas.openxmlformats.org/officeDocument/2006/math" xmlns="" val="1"/>
+              <ma14:wrappingTextBoxFlag xmlns="" xmlns:m="http://schemas.openxmlformats.org/officeDocument/2006/math" xmlns:a14="http://schemas.microsoft.com/office/drawing/2010/main" xmlns:ma14="http://schemas.microsoft.com/office/mac/drawingml/2011/main" val="1"/>
             </a:ext>
           </a:extLst>
         </p:spPr>
@@ -25145,7 +25145,7 @@
             <a:effectLst/>
             <a:extLst>
               <a:ext uri="{C572A759-6A51-4108-AA02-DFA0A04FC94B}">
-                <ma14:wrappingTextBoxFlag xmlns:ma14="http://schemas.microsoft.com/office/mac/drawingml/2011/main" xmlns:a14="http://schemas.microsoft.com/office/drawing/2010/main" xmlns:m="http://schemas.openxmlformats.org/officeDocument/2006/math" xmlns="" val="1"/>
+                <ma14:wrappingTextBoxFlag xmlns="" xmlns:m="http://schemas.openxmlformats.org/officeDocument/2006/math" xmlns:a14="http://schemas.microsoft.com/office/drawing/2010/main" xmlns:ma14="http://schemas.microsoft.com/office/mac/drawingml/2011/main" val="1"/>
               </a:ext>
             </a:extLst>
           </p:spPr>
@@ -25356,7 +25356,7 @@
             <a:effectLst/>
             <a:extLst>
               <a:ext uri="{C572A759-6A51-4108-AA02-DFA0A04FC94B}">
-                <ma14:wrappingTextBoxFlag xmlns:ma14="http://schemas.microsoft.com/office/mac/drawingml/2011/main" xmlns:a14="http://schemas.microsoft.com/office/drawing/2010/main" xmlns:m="http://schemas.openxmlformats.org/officeDocument/2006/math" xmlns="" val="1"/>
+                <ma14:wrappingTextBoxFlag xmlns="" xmlns:m="http://schemas.openxmlformats.org/officeDocument/2006/math" xmlns:a14="http://schemas.microsoft.com/office/drawing/2010/main" xmlns:ma14="http://schemas.microsoft.com/office/mac/drawingml/2011/main" val="1"/>
               </a:ext>
             </a:extLst>
           </p:spPr>
@@ -25695,7 +25695,7 @@
           </a:prstGeom>
           <a:extLst>
             <a:ext uri="{C572A759-6A51-4108-AA02-DFA0A04FC94B}">
-              <ma14:wrappingTextBoxFlag xmlns:ma14="http://schemas.microsoft.com/office/mac/drawingml/2011/main" xmlns:a14="http://schemas.microsoft.com/office/drawing/2010/main" xmlns:m="http://schemas.openxmlformats.org/officeDocument/2006/math" xmlns="" val="1"/>
+              <ma14:wrappingTextBoxFlag xmlns="" xmlns:m="http://schemas.openxmlformats.org/officeDocument/2006/math" xmlns:a14="http://schemas.microsoft.com/office/drawing/2010/main" xmlns:ma14="http://schemas.microsoft.com/office/mac/drawingml/2011/main" val="1"/>
             </a:ext>
           </a:extLst>
         </p:spPr>
@@ -25733,7 +25733,7 @@
           </a:ln>
           <a:extLst>
             <a:ext uri="{C572A759-6A51-4108-AA02-DFA0A04FC94B}">
-              <ma14:wrappingTextBoxFlag xmlns:ma14="http://schemas.microsoft.com/office/mac/drawingml/2011/main" xmlns:a14="http://schemas.microsoft.com/office/drawing/2010/main" xmlns:m="http://schemas.openxmlformats.org/officeDocument/2006/math" xmlns="" val="1"/>
+              <ma14:wrappingTextBoxFlag xmlns="" xmlns:m="http://schemas.openxmlformats.org/officeDocument/2006/math" xmlns:a14="http://schemas.microsoft.com/office/drawing/2010/main" xmlns:ma14="http://schemas.microsoft.com/office/mac/drawingml/2011/main" val="1"/>
             </a:ext>
           </a:extLst>
         </p:spPr>
@@ -26800,7 +26800,7 @@
           </a:ln>
           <a:extLst>
             <a:ext uri="{C572A759-6A51-4108-AA02-DFA0A04FC94B}">
-              <ma14:wrappingTextBoxFlag xmlns:ma14="http://schemas.microsoft.com/office/mac/drawingml/2011/main" xmlns:a14="http://schemas.microsoft.com/office/drawing/2010/main" xmlns:m="http://schemas.openxmlformats.org/officeDocument/2006/math" xmlns="" val="1"/>
+              <ma14:wrappingTextBoxFlag xmlns="" xmlns:m="http://schemas.openxmlformats.org/officeDocument/2006/math" xmlns:a14="http://schemas.microsoft.com/office/drawing/2010/main" xmlns:ma14="http://schemas.microsoft.com/office/mac/drawingml/2011/main" val="1"/>
             </a:ext>
           </a:extLst>
         </p:spPr>
@@ -27832,7 +27832,7 @@
           </a:ln>
           <a:extLst>
             <a:ext uri="{C572A759-6A51-4108-AA02-DFA0A04FC94B}">
-              <ma14:wrappingTextBoxFlag xmlns:ma14="http://schemas.microsoft.com/office/mac/drawingml/2011/main" xmlns:a14="http://schemas.microsoft.com/office/drawing/2010/main" xmlns:m="http://schemas.openxmlformats.org/officeDocument/2006/math" xmlns="" val="1"/>
+              <ma14:wrappingTextBoxFlag xmlns="" xmlns:m="http://schemas.openxmlformats.org/officeDocument/2006/math" xmlns:a14="http://schemas.microsoft.com/office/drawing/2010/main" xmlns:ma14="http://schemas.microsoft.com/office/mac/drawingml/2011/main" val="1"/>
             </a:ext>
           </a:extLst>
         </p:spPr>
@@ -27890,7 +27890,7 @@
           </a:ln>
           <a:extLst>
             <a:ext uri="{C572A759-6A51-4108-AA02-DFA0A04FC94B}">
-              <ma14:wrappingTextBoxFlag xmlns:ma14="http://schemas.microsoft.com/office/mac/drawingml/2011/main" xmlns:a14="http://schemas.microsoft.com/office/drawing/2010/main" xmlns:m="http://schemas.openxmlformats.org/officeDocument/2006/math" xmlns="" val="1"/>
+              <ma14:wrappingTextBoxFlag xmlns="" xmlns:m="http://schemas.openxmlformats.org/officeDocument/2006/math" xmlns:a14="http://schemas.microsoft.com/office/drawing/2010/main" xmlns:ma14="http://schemas.microsoft.com/office/mac/drawingml/2011/main" val="1"/>
             </a:ext>
           </a:extLst>
         </p:spPr>
@@ -27934,7 +27934,7 @@
           </a:ln>
           <a:extLst>
             <a:ext uri="{C572A759-6A51-4108-AA02-DFA0A04FC94B}">
-              <ma14:wrappingTextBoxFlag xmlns:ma14="http://schemas.microsoft.com/office/mac/drawingml/2011/main" xmlns:a14="http://schemas.microsoft.com/office/drawing/2010/main" xmlns:m="http://schemas.openxmlformats.org/officeDocument/2006/math" xmlns="" val="1"/>
+              <ma14:wrappingTextBoxFlag xmlns="" xmlns:m="http://schemas.openxmlformats.org/officeDocument/2006/math" xmlns:a14="http://schemas.microsoft.com/office/drawing/2010/main" xmlns:ma14="http://schemas.microsoft.com/office/mac/drawingml/2011/main" val="1"/>
             </a:ext>
           </a:extLst>
         </p:spPr>
@@ -27970,7 +27970,7 @@
           </a:ln>
           <a:extLst>
             <a:ext uri="{C572A759-6A51-4108-AA02-DFA0A04FC94B}">
-              <ma14:wrappingTextBoxFlag xmlns:ma14="http://schemas.microsoft.com/office/mac/drawingml/2011/main" xmlns:a14="http://schemas.microsoft.com/office/drawing/2010/main" xmlns:m="http://schemas.openxmlformats.org/officeDocument/2006/math" xmlns="" val="1"/>
+              <ma14:wrappingTextBoxFlag xmlns="" xmlns:m="http://schemas.openxmlformats.org/officeDocument/2006/math" xmlns:a14="http://schemas.microsoft.com/office/drawing/2010/main" xmlns:ma14="http://schemas.microsoft.com/office/mac/drawingml/2011/main" val="1"/>
             </a:ext>
           </a:extLst>
         </p:spPr>
@@ -28058,7 +28058,7 @@
             <a:effectLst/>
             <a:extLst>
               <a:ext uri="{C572A759-6A51-4108-AA02-DFA0A04FC94B}">
-                <ma14:wrappingTextBoxFlag xmlns:ma14="http://schemas.microsoft.com/office/mac/drawingml/2011/main" xmlns:a14="http://schemas.microsoft.com/office/drawing/2010/main" xmlns:m="http://schemas.openxmlformats.org/officeDocument/2006/math" xmlns="" val="1"/>
+                <ma14:wrappingTextBoxFlag xmlns="" xmlns:m="http://schemas.openxmlformats.org/officeDocument/2006/math" xmlns:a14="http://schemas.microsoft.com/office/drawing/2010/main" xmlns:ma14="http://schemas.microsoft.com/office/mac/drawingml/2011/main" val="1"/>
               </a:ext>
             </a:extLst>
           </p:spPr>
@@ -28320,7 +28320,7 @@
             <a:effectLst/>
             <a:extLst>
               <a:ext uri="{C572A759-6A51-4108-AA02-DFA0A04FC94B}">
-                <ma14:wrappingTextBoxFlag xmlns:ma14="http://schemas.microsoft.com/office/mac/drawingml/2011/main" xmlns:a14="http://schemas.microsoft.com/office/drawing/2010/main" xmlns:m="http://schemas.openxmlformats.org/officeDocument/2006/math" xmlns="" val="1"/>
+                <ma14:wrappingTextBoxFlag xmlns="" xmlns:m="http://schemas.openxmlformats.org/officeDocument/2006/math" xmlns:a14="http://schemas.microsoft.com/office/drawing/2010/main" xmlns:ma14="http://schemas.microsoft.com/office/mac/drawingml/2011/main" val="1"/>
               </a:ext>
             </a:extLst>
           </p:spPr>
@@ -29276,7 +29276,7 @@
           </a:prstGeom>
           <a:extLst>
             <a:ext uri="{C572A759-6A51-4108-AA02-DFA0A04FC94B}">
-              <ma14:wrappingTextBoxFlag xmlns:ma14="http://schemas.microsoft.com/office/mac/drawingml/2011/main" xmlns:a14="http://schemas.microsoft.com/office/drawing/2010/main" xmlns:m="http://schemas.openxmlformats.org/officeDocument/2006/math" xmlns="" val="1"/>
+              <ma14:wrappingTextBoxFlag xmlns="" xmlns:m="http://schemas.openxmlformats.org/officeDocument/2006/math" xmlns:a14="http://schemas.microsoft.com/office/drawing/2010/main" xmlns:ma14="http://schemas.microsoft.com/office/mac/drawingml/2011/main" val="1"/>
             </a:ext>
           </a:extLst>
         </p:spPr>
@@ -29329,7 +29329,7 @@
           </a:ln>
           <a:extLst>
             <a:ext uri="{C572A759-6A51-4108-AA02-DFA0A04FC94B}">
-              <ma14:wrappingTextBoxFlag xmlns:ma14="http://schemas.microsoft.com/office/mac/drawingml/2011/main" xmlns:a14="http://schemas.microsoft.com/office/drawing/2010/main" xmlns:m="http://schemas.openxmlformats.org/officeDocument/2006/math" xmlns="" val="1"/>
+              <ma14:wrappingTextBoxFlag xmlns="" xmlns:m="http://schemas.openxmlformats.org/officeDocument/2006/math" xmlns:a14="http://schemas.microsoft.com/office/drawing/2010/main" xmlns:ma14="http://schemas.microsoft.com/office/mac/drawingml/2011/main" val="1"/>
             </a:ext>
           </a:extLst>
         </p:spPr>
@@ -30461,7 +30461,7 @@
           </a:ln>
           <a:extLst>
             <a:ext uri="{C572A759-6A51-4108-AA02-DFA0A04FC94B}">
-              <ma14:wrappingTextBoxFlag xmlns:ma14="http://schemas.microsoft.com/office/mac/drawingml/2011/main" xmlns:a14="http://schemas.microsoft.com/office/drawing/2010/main" xmlns:m="http://schemas.openxmlformats.org/officeDocument/2006/math" xmlns="" val="1"/>
+              <ma14:wrappingTextBoxFlag xmlns="" xmlns:m="http://schemas.openxmlformats.org/officeDocument/2006/math" xmlns:a14="http://schemas.microsoft.com/office/drawing/2010/main" xmlns:ma14="http://schemas.microsoft.com/office/mac/drawingml/2011/main" val="1"/>
             </a:ext>
           </a:extLst>
         </p:spPr>
@@ -31849,7 +31849,7 @@
           </a:prstGeom>
           <a:extLst>
             <a:ext uri="{C572A759-6A51-4108-AA02-DFA0A04FC94B}">
-              <ma14:wrappingTextBoxFlag xmlns:ma14="http://schemas.microsoft.com/office/mac/drawingml/2011/main" xmlns:a14="http://schemas.microsoft.com/office/drawing/2010/main" xmlns:m="http://schemas.openxmlformats.org/officeDocument/2006/math" xmlns="" val="1"/>
+              <ma14:wrappingTextBoxFlag xmlns="" xmlns:m="http://schemas.openxmlformats.org/officeDocument/2006/math" xmlns:a14="http://schemas.microsoft.com/office/drawing/2010/main" xmlns:ma14="http://schemas.microsoft.com/office/mac/drawingml/2011/main" val="1"/>
             </a:ext>
           </a:extLst>
         </p:spPr>
@@ -32000,7 +32000,7 @@
           </a:ln>
           <a:extLst>
             <a:ext uri="{C572A759-6A51-4108-AA02-DFA0A04FC94B}">
-              <ma14:wrappingTextBoxFlag xmlns:ma14="http://schemas.microsoft.com/office/mac/drawingml/2011/main" xmlns:a14="http://schemas.microsoft.com/office/drawing/2010/main" xmlns:m="http://schemas.openxmlformats.org/officeDocument/2006/math" xmlns="" val="1"/>
+              <ma14:wrappingTextBoxFlag xmlns="" xmlns:m="http://schemas.openxmlformats.org/officeDocument/2006/math" xmlns:a14="http://schemas.microsoft.com/office/drawing/2010/main" xmlns:ma14="http://schemas.microsoft.com/office/mac/drawingml/2011/main" val="1"/>
             </a:ext>
           </a:extLst>
         </p:spPr>
@@ -32106,7 +32106,7 @@
           </a:ln>
           <a:extLst>
             <a:ext uri="{C572A759-6A51-4108-AA02-DFA0A04FC94B}">
-              <ma14:wrappingTextBoxFlag xmlns:ma14="http://schemas.microsoft.com/office/mac/drawingml/2011/main" xmlns:a14="http://schemas.microsoft.com/office/drawing/2010/main" xmlns:m="http://schemas.openxmlformats.org/officeDocument/2006/math" xmlns="" val="1"/>
+              <ma14:wrappingTextBoxFlag xmlns="" xmlns:m="http://schemas.openxmlformats.org/officeDocument/2006/math" xmlns:a14="http://schemas.microsoft.com/office/drawing/2010/main" xmlns:ma14="http://schemas.microsoft.com/office/mac/drawingml/2011/main" val="1"/>
             </a:ext>
           </a:extLst>
         </p:spPr>
@@ -32402,11 +32402,17 @@
               <a:rPr lang="en-US" sz="2400" dirty="0">
                 <a:hlinkClick r:id="rId3"/>
               </a:rPr>
-              <a:t>https://bit.ly/35JPetn</a:t>
-            </a:r>
-            <a:r>
-              <a:rPr lang="en-US" sz="2400" dirty="0"/>
-              <a:t> </a:t>
+              <a:t>https://bit.ly</a:t>
+            </a:r>
+            <a:r>
+              <a:rPr lang="en-US" sz="2400">
+                <a:hlinkClick r:id="rId3"/>
+              </a:rPr>
+              <a:t>/34GbcN6</a:t>
+            </a:r>
+            <a:r>
+              <a:rPr lang="en-US" sz="2400"/>
+              <a:t>  </a:t>
             </a:r>
             <a:endParaRPr kumimoji="0" lang="en-US" sz="2400" b="0" i="0" u="none" strike="noStrike" cap="none" spc="0" normalizeH="0" baseline="0" dirty="0">
               <a:ln>
@@ -32635,7 +32641,7 @@
           </a:prstGeom>
           <a:extLst>
             <a:ext uri="{C572A759-6A51-4108-AA02-DFA0A04FC94B}">
-              <ma14:wrappingTextBoxFlag xmlns:ma14="http://schemas.microsoft.com/office/mac/drawingml/2011/main" xmlns:a14="http://schemas.microsoft.com/office/drawing/2010/main" xmlns:m="http://schemas.openxmlformats.org/officeDocument/2006/math" xmlns="" val="1"/>
+              <ma14:wrappingTextBoxFlag xmlns="" xmlns:m="http://schemas.openxmlformats.org/officeDocument/2006/math" xmlns:a14="http://schemas.microsoft.com/office/drawing/2010/main" xmlns:ma14="http://schemas.microsoft.com/office/mac/drawingml/2011/main" val="1"/>
             </a:ext>
           </a:extLst>
         </p:spPr>
@@ -32677,7 +32683,7 @@
           </a:ln>
           <a:extLst>
             <a:ext uri="{C572A759-6A51-4108-AA02-DFA0A04FC94B}">
-              <ma14:wrappingTextBoxFlag xmlns:ma14="http://schemas.microsoft.com/office/mac/drawingml/2011/main" xmlns:a14="http://schemas.microsoft.com/office/drawing/2010/main" xmlns:m="http://schemas.openxmlformats.org/officeDocument/2006/math" xmlns="" val="1"/>
+              <ma14:wrappingTextBoxFlag xmlns="" xmlns:m="http://schemas.openxmlformats.org/officeDocument/2006/math" xmlns:a14="http://schemas.microsoft.com/office/drawing/2010/main" xmlns:ma14="http://schemas.microsoft.com/office/mac/drawingml/2011/main" val="1"/>
             </a:ext>
           </a:extLst>
         </p:spPr>
@@ -32941,7 +32947,7 @@
           </a:ln>
           <a:extLst>
             <a:ext uri="{C572A759-6A51-4108-AA02-DFA0A04FC94B}">
-              <ma14:wrappingTextBoxFlag xmlns="" xmlns:m="http://schemas.openxmlformats.org/officeDocument/2006/math" xmlns:a14="http://schemas.microsoft.com/office/drawing/2010/main" xmlns:ma14="http://schemas.microsoft.com/office/mac/drawingml/2011/main" val="1"/>
+              <ma14:wrappingTextBoxFlag xmlns:ma14="http://schemas.microsoft.com/office/mac/drawingml/2011/main" xmlns:a14="http://schemas.microsoft.com/office/drawing/2010/main" xmlns:m="http://schemas.openxmlformats.org/officeDocument/2006/math" xmlns="" val="1"/>
             </a:ext>
           </a:extLst>
         </p:spPr>
@@ -33401,7 +33407,7 @@
             </a:ln>
             <a:extLst>
               <a:ext uri="{C572A759-6A51-4108-AA02-DFA0A04FC94B}">
-                <ma14:wrappingTextBoxFlag xmlns:ma14="http://schemas.microsoft.com/office/mac/drawingml/2011/main" xmlns:a14="http://schemas.microsoft.com/office/drawing/2010/main" xmlns:m="http://schemas.openxmlformats.org/officeDocument/2006/math" xmlns="" val="1"/>
+                <ma14:wrappingTextBoxFlag xmlns="" xmlns:m="http://schemas.openxmlformats.org/officeDocument/2006/math" xmlns:a14="http://schemas.microsoft.com/office/drawing/2010/main" xmlns:ma14="http://schemas.microsoft.com/office/mac/drawingml/2011/main" val="1"/>
               </a:ext>
             </a:extLst>
           </p:spPr>
@@ -33756,7 +33762,7 @@
           </a:prstGeom>
           <a:extLst>
             <a:ext uri="{C572A759-6A51-4108-AA02-DFA0A04FC94B}">
-              <ma14:wrappingTextBoxFlag xmlns:ma14="http://schemas.microsoft.com/office/mac/drawingml/2011/main" xmlns:a14="http://schemas.microsoft.com/office/drawing/2010/main" xmlns:m="http://schemas.openxmlformats.org/officeDocument/2006/math" xmlns="" val="1"/>
+              <ma14:wrappingTextBoxFlag xmlns="" xmlns:m="http://schemas.openxmlformats.org/officeDocument/2006/math" xmlns:a14="http://schemas.microsoft.com/office/drawing/2010/main" xmlns:ma14="http://schemas.microsoft.com/office/mac/drawingml/2011/main" val="1"/>
             </a:ext>
           </a:extLst>
         </p:spPr>
@@ -33797,7 +33803,7 @@
           </a:ln>
           <a:extLst>
             <a:ext uri="{C572A759-6A51-4108-AA02-DFA0A04FC94B}">
-              <ma14:wrappingTextBoxFlag xmlns:ma14="http://schemas.microsoft.com/office/mac/drawingml/2011/main" xmlns:a14="http://schemas.microsoft.com/office/drawing/2010/main" xmlns:m="http://schemas.openxmlformats.org/officeDocument/2006/math" xmlns="" val="1"/>
+              <ma14:wrappingTextBoxFlag xmlns="" xmlns:m="http://schemas.openxmlformats.org/officeDocument/2006/math" xmlns:a14="http://schemas.microsoft.com/office/drawing/2010/main" xmlns:ma14="http://schemas.microsoft.com/office/mac/drawingml/2011/main" val="1"/>
             </a:ext>
           </a:extLst>
         </p:spPr>
@@ -34642,7 +34648,7 @@
           </a:ln>
           <a:extLst>
             <a:ext uri="{C572A759-6A51-4108-AA02-DFA0A04FC94B}">
-              <ma14:wrappingTextBoxFlag xmlns:ma14="http://schemas.microsoft.com/office/mac/drawingml/2011/main" xmlns:a14="http://schemas.microsoft.com/office/drawing/2010/main" xmlns:m="http://schemas.openxmlformats.org/officeDocument/2006/math" xmlns="" val="1"/>
+              <ma14:wrappingTextBoxFlag xmlns="" xmlns:m="http://schemas.openxmlformats.org/officeDocument/2006/math" xmlns:a14="http://schemas.microsoft.com/office/drawing/2010/main" xmlns:ma14="http://schemas.microsoft.com/office/mac/drawingml/2011/main" val="1"/>
             </a:ext>
           </a:extLst>
         </p:spPr>
@@ -34756,7 +34762,7 @@
           </a:ln>
           <a:extLst>
             <a:ext uri="{C572A759-6A51-4108-AA02-DFA0A04FC94B}">
-              <ma14:wrappingTextBoxFlag xmlns:ma14="http://schemas.microsoft.com/office/mac/drawingml/2011/main" xmlns:a14="http://schemas.microsoft.com/office/drawing/2010/main" xmlns:m="http://schemas.openxmlformats.org/officeDocument/2006/math" xmlns="" val="1"/>
+              <ma14:wrappingTextBoxFlag xmlns="" xmlns:m="http://schemas.openxmlformats.org/officeDocument/2006/math" xmlns:a14="http://schemas.microsoft.com/office/drawing/2010/main" xmlns:ma14="http://schemas.microsoft.com/office/mac/drawingml/2011/main" val="1"/>
             </a:ext>
           </a:extLst>
         </p:spPr>
@@ -34800,7 +34806,7 @@
           </a:ln>
           <a:extLst>
             <a:ext uri="{C572A759-6A51-4108-AA02-DFA0A04FC94B}">
-              <ma14:wrappingTextBoxFlag xmlns:ma14="http://schemas.microsoft.com/office/mac/drawingml/2011/main" xmlns:a14="http://schemas.microsoft.com/office/drawing/2010/main" xmlns:m="http://schemas.openxmlformats.org/officeDocument/2006/math" xmlns="" val="1"/>
+              <ma14:wrappingTextBoxFlag xmlns="" xmlns:m="http://schemas.openxmlformats.org/officeDocument/2006/math" xmlns:a14="http://schemas.microsoft.com/office/drawing/2010/main" xmlns:ma14="http://schemas.microsoft.com/office/mac/drawingml/2011/main" val="1"/>
             </a:ext>
           </a:extLst>
         </p:spPr>
@@ -34865,7 +34871,7 @@
             <a:effectLst/>
             <a:extLst>
               <a:ext uri="{C572A759-6A51-4108-AA02-DFA0A04FC94B}">
-                <ma14:wrappingTextBoxFlag xmlns:ma14="http://schemas.microsoft.com/office/mac/drawingml/2011/main" xmlns:a14="http://schemas.microsoft.com/office/drawing/2010/main" xmlns:m="http://schemas.openxmlformats.org/officeDocument/2006/math" xmlns="" val="1"/>
+                <ma14:wrappingTextBoxFlag xmlns="" xmlns:m="http://schemas.openxmlformats.org/officeDocument/2006/math" xmlns:a14="http://schemas.microsoft.com/office/drawing/2010/main" xmlns:ma14="http://schemas.microsoft.com/office/mac/drawingml/2011/main" val="1"/>
               </a:ext>
             </a:extLst>
           </p:spPr>
@@ -35042,7 +35048,7 @@
             <a:effectLst/>
             <a:extLst>
               <a:ext uri="{C572A759-6A51-4108-AA02-DFA0A04FC94B}">
-                <ma14:wrappingTextBoxFlag xmlns:ma14="http://schemas.microsoft.com/office/mac/drawingml/2011/main" xmlns:a14="http://schemas.microsoft.com/office/drawing/2010/main" xmlns:m="http://schemas.openxmlformats.org/officeDocument/2006/math" xmlns="" val="1"/>
+                <ma14:wrappingTextBoxFlag xmlns="" xmlns:m="http://schemas.openxmlformats.org/officeDocument/2006/math" xmlns:a14="http://schemas.microsoft.com/office/drawing/2010/main" xmlns:ma14="http://schemas.microsoft.com/office/mac/drawingml/2011/main" val="1"/>
               </a:ext>
             </a:extLst>
           </p:spPr>
@@ -36672,7 +36678,7 @@
           </a:prstGeom>
           <a:extLst>
             <a:ext uri="{C572A759-6A51-4108-AA02-DFA0A04FC94B}">
-              <ma14:wrappingTextBoxFlag xmlns:ma14="http://schemas.microsoft.com/office/mac/drawingml/2011/main" xmlns:a14="http://schemas.microsoft.com/office/drawing/2010/main" xmlns:m="http://schemas.openxmlformats.org/officeDocument/2006/math" xmlns="" val="1"/>
+              <ma14:wrappingTextBoxFlag xmlns="" xmlns:m="http://schemas.openxmlformats.org/officeDocument/2006/math" xmlns:a14="http://schemas.microsoft.com/office/drawing/2010/main" xmlns:ma14="http://schemas.microsoft.com/office/mac/drawingml/2011/main" val="1"/>
             </a:ext>
           </a:extLst>
         </p:spPr>
@@ -36766,7 +36772,7 @@
           </a:prstGeom>
           <a:extLst>
             <a:ext uri="{C572A759-6A51-4108-AA02-DFA0A04FC94B}">
-              <ma14:wrappingTextBoxFlag xmlns:ma14="http://schemas.microsoft.com/office/mac/drawingml/2011/main" xmlns:a14="http://schemas.microsoft.com/office/drawing/2010/main" xmlns:m="http://schemas.openxmlformats.org/officeDocument/2006/math" xmlns="" val="1"/>
+              <ma14:wrappingTextBoxFlag xmlns="" xmlns:m="http://schemas.openxmlformats.org/officeDocument/2006/math" xmlns:a14="http://schemas.microsoft.com/office/drawing/2010/main" xmlns:ma14="http://schemas.microsoft.com/office/mac/drawingml/2011/main" val="1"/>
             </a:ext>
           </a:extLst>
         </p:spPr>
@@ -36806,7 +36812,7 @@
           </a:ln>
           <a:extLst>
             <a:ext uri="{C572A759-6A51-4108-AA02-DFA0A04FC94B}">
-              <ma14:wrappingTextBoxFlag xmlns:ma14="http://schemas.microsoft.com/office/mac/drawingml/2011/main" xmlns:a14="http://schemas.microsoft.com/office/drawing/2010/main" xmlns:m="http://schemas.openxmlformats.org/officeDocument/2006/math" xmlns="" val="1"/>
+              <ma14:wrappingTextBoxFlag xmlns="" xmlns:m="http://schemas.openxmlformats.org/officeDocument/2006/math" xmlns:a14="http://schemas.microsoft.com/office/drawing/2010/main" xmlns:ma14="http://schemas.microsoft.com/office/mac/drawingml/2011/main" val="1"/>
             </a:ext>
           </a:extLst>
         </p:spPr>
@@ -37295,7 +37301,7 @@
           </a:ln>
           <a:extLst>
             <a:ext uri="{C572A759-6A51-4108-AA02-DFA0A04FC94B}">
-              <ma14:wrappingTextBoxFlag xmlns:ma14="http://schemas.microsoft.com/office/mac/drawingml/2011/main" xmlns:a14="http://schemas.microsoft.com/office/drawing/2010/main" xmlns:m="http://schemas.openxmlformats.org/officeDocument/2006/math" xmlns="" val="1"/>
+              <ma14:wrappingTextBoxFlag xmlns="" xmlns:m="http://schemas.openxmlformats.org/officeDocument/2006/math" xmlns:a14="http://schemas.microsoft.com/office/drawing/2010/main" xmlns:ma14="http://schemas.microsoft.com/office/mac/drawingml/2011/main" val="1"/>
             </a:ext>
           </a:extLst>
         </p:spPr>
@@ -37894,7 +37900,7 @@
           </a:ln>
           <a:extLst>
             <a:ext uri="{C572A759-6A51-4108-AA02-DFA0A04FC94B}">
-              <ma14:wrappingTextBoxFlag xmlns:ma14="http://schemas.microsoft.com/office/mac/drawingml/2011/main" xmlns:a14="http://schemas.microsoft.com/office/drawing/2010/main" xmlns:m="http://schemas.openxmlformats.org/officeDocument/2006/math" xmlns="" val="1"/>
+              <ma14:wrappingTextBoxFlag xmlns="" xmlns:m="http://schemas.openxmlformats.org/officeDocument/2006/math" xmlns:a14="http://schemas.microsoft.com/office/drawing/2010/main" xmlns:ma14="http://schemas.microsoft.com/office/mac/drawingml/2011/main" val="1"/>
             </a:ext>
           </a:extLst>
         </p:spPr>
@@ -38144,7 +38150,7 @@
           </a:prstGeom>
           <a:extLst>
             <a:ext uri="{C572A759-6A51-4108-AA02-DFA0A04FC94B}">
-              <ma14:wrappingTextBoxFlag xmlns="" xmlns:m="http://schemas.openxmlformats.org/officeDocument/2006/math" xmlns:a14="http://schemas.microsoft.com/office/drawing/2010/main" xmlns:ma14="http://schemas.microsoft.com/office/mac/drawingml/2011/main" val="1"/>
+              <ma14:wrappingTextBoxFlag xmlns:ma14="http://schemas.microsoft.com/office/mac/drawingml/2011/main" xmlns:a14="http://schemas.microsoft.com/office/drawing/2010/main" xmlns:m="http://schemas.openxmlformats.org/officeDocument/2006/math" xmlns="" val="1"/>
             </a:ext>
           </a:extLst>
         </p:spPr>
@@ -38309,7 +38315,7 @@
             <a:effectLst/>
             <a:extLst>
               <a:ext uri="{C572A759-6A51-4108-AA02-DFA0A04FC94B}">
-                <ma14:wrappingTextBoxFlag xmlns="" xmlns:m="http://schemas.openxmlformats.org/officeDocument/2006/math" xmlns:a14="http://schemas.microsoft.com/office/drawing/2010/main" xmlns:ma14="http://schemas.microsoft.com/office/mac/drawingml/2011/main" val="1"/>
+                <ma14:wrappingTextBoxFlag xmlns:ma14="http://schemas.microsoft.com/office/mac/drawingml/2011/main" xmlns:a14="http://schemas.microsoft.com/office/drawing/2010/main" xmlns:m="http://schemas.openxmlformats.org/officeDocument/2006/math" xmlns="" val="1"/>
               </a:ext>
             </a:extLst>
           </p:spPr>
@@ -38440,7 +38446,7 @@
             <a:effectLst/>
             <a:extLst>
               <a:ext uri="{C572A759-6A51-4108-AA02-DFA0A04FC94B}">
-                <ma14:wrappingTextBoxFlag xmlns="" xmlns:m="http://schemas.openxmlformats.org/officeDocument/2006/math" xmlns:a14="http://schemas.microsoft.com/office/drawing/2010/main" xmlns:ma14="http://schemas.microsoft.com/office/mac/drawingml/2011/main" val="1"/>
+                <ma14:wrappingTextBoxFlag xmlns:ma14="http://schemas.microsoft.com/office/mac/drawingml/2011/main" xmlns:a14="http://schemas.microsoft.com/office/drawing/2010/main" xmlns:m="http://schemas.openxmlformats.org/officeDocument/2006/math" xmlns="" val="1"/>
               </a:ext>
             </a:extLst>
           </p:spPr>
@@ -38495,7 +38501,7 @@
           </a:ln>
           <a:extLst>
             <a:ext uri="{C572A759-6A51-4108-AA02-DFA0A04FC94B}">
-              <ma14:wrappingTextBoxFlag xmlns:ma14="http://schemas.microsoft.com/office/mac/drawingml/2011/main" xmlns:a14="http://schemas.microsoft.com/office/drawing/2010/main" xmlns:m="http://schemas.openxmlformats.org/officeDocument/2006/math" xmlns="" val="1"/>
+              <ma14:wrappingTextBoxFlag xmlns="" xmlns:m="http://schemas.openxmlformats.org/officeDocument/2006/math" xmlns:a14="http://schemas.microsoft.com/office/drawing/2010/main" xmlns:ma14="http://schemas.microsoft.com/office/mac/drawingml/2011/main" val="1"/>
             </a:ext>
           </a:extLst>
         </p:spPr>
@@ -38747,7 +38753,7 @@
             <a:effectLst/>
             <a:extLst>
               <a:ext uri="{C572A759-6A51-4108-AA02-DFA0A04FC94B}">
-                <ma14:wrappingTextBoxFlag xmlns="" xmlns:m="http://schemas.openxmlformats.org/officeDocument/2006/math" xmlns:a14="http://schemas.microsoft.com/office/drawing/2010/main" xmlns:ma14="http://schemas.microsoft.com/office/mac/drawingml/2011/main" val="1"/>
+                <ma14:wrappingTextBoxFlag xmlns:ma14="http://schemas.microsoft.com/office/mac/drawingml/2011/main" xmlns:a14="http://schemas.microsoft.com/office/drawing/2010/main" xmlns:m="http://schemas.openxmlformats.org/officeDocument/2006/math" xmlns="" val="1"/>
               </a:ext>
             </a:extLst>
           </p:spPr>
@@ -38874,7 +38880,7 @@
             <a:effectLst/>
             <a:extLst>
               <a:ext uri="{C572A759-6A51-4108-AA02-DFA0A04FC94B}">
-                <ma14:wrappingTextBoxFlag xmlns="" xmlns:m="http://schemas.openxmlformats.org/officeDocument/2006/math" xmlns:a14="http://schemas.microsoft.com/office/drawing/2010/main" xmlns:ma14="http://schemas.microsoft.com/office/mac/drawingml/2011/main" val="1"/>
+                <ma14:wrappingTextBoxFlag xmlns:ma14="http://schemas.microsoft.com/office/mac/drawingml/2011/main" xmlns:a14="http://schemas.microsoft.com/office/drawing/2010/main" xmlns:m="http://schemas.openxmlformats.org/officeDocument/2006/math" xmlns="" val="1"/>
               </a:ext>
             </a:extLst>
           </p:spPr>
@@ -39244,7 +39250,7 @@
           </a:ln>
           <a:extLst>
             <a:ext uri="{C572A759-6A51-4108-AA02-DFA0A04FC94B}">
-              <ma14:wrappingTextBoxFlag xmlns="" xmlns:m="http://schemas.openxmlformats.org/officeDocument/2006/math" xmlns:a14="http://schemas.microsoft.com/office/drawing/2010/main" xmlns:ma14="http://schemas.microsoft.com/office/mac/drawingml/2011/main" val="1"/>
+              <ma14:wrappingTextBoxFlag xmlns:ma14="http://schemas.microsoft.com/office/mac/drawingml/2011/main" xmlns:a14="http://schemas.microsoft.com/office/drawing/2010/main" xmlns:m="http://schemas.openxmlformats.org/officeDocument/2006/math" xmlns="" val="1"/>
             </a:ext>
           </a:extLst>
         </p:spPr>
@@ -39591,7 +39597,7 @@
           </a:ln>
           <a:extLst>
             <a:ext uri="{C572A759-6A51-4108-AA02-DFA0A04FC94B}">
-              <ma14:wrappingTextBoxFlag xmlns="" xmlns:m="http://schemas.openxmlformats.org/officeDocument/2006/math" xmlns:a14="http://schemas.microsoft.com/office/drawing/2010/main" xmlns:ma14="http://schemas.microsoft.com/office/mac/drawingml/2011/main" val="1"/>
+              <ma14:wrappingTextBoxFlag xmlns:ma14="http://schemas.microsoft.com/office/mac/drawingml/2011/main" xmlns:a14="http://schemas.microsoft.com/office/drawing/2010/main" xmlns:m="http://schemas.openxmlformats.org/officeDocument/2006/math" xmlns="" val="1"/>
             </a:ext>
           </a:extLst>
         </p:spPr>
@@ -39963,7 +39969,7 @@
             <a:effectLst/>
             <a:extLst>
               <a:ext uri="{C572A759-6A51-4108-AA02-DFA0A04FC94B}">
-                <ma14:wrappingTextBoxFlag xmlns:ma14="http://schemas.microsoft.com/office/mac/drawingml/2011/main" xmlns:a14="http://schemas.microsoft.com/office/drawing/2010/main" xmlns:m="http://schemas.openxmlformats.org/officeDocument/2006/math" xmlns="" val="1"/>
+                <ma14:wrappingTextBoxFlag xmlns="" xmlns:m="http://schemas.openxmlformats.org/officeDocument/2006/math" xmlns:a14="http://schemas.microsoft.com/office/drawing/2010/main" xmlns:ma14="http://schemas.microsoft.com/office/mac/drawingml/2011/main" val="1"/>
               </a:ext>
             </a:extLst>
           </p:spPr>
@@ -40027,7 +40033,7 @@
             <a:effectLst/>
             <a:extLst>
               <a:ext uri="{C572A759-6A51-4108-AA02-DFA0A04FC94B}">
-                <ma14:wrappingTextBoxFlag xmlns:ma14="http://schemas.microsoft.com/office/mac/drawingml/2011/main" xmlns:a14="http://schemas.microsoft.com/office/drawing/2010/main" xmlns:m="http://schemas.openxmlformats.org/officeDocument/2006/math" xmlns="" val="1"/>
+                <ma14:wrappingTextBoxFlag xmlns="" xmlns:m="http://schemas.openxmlformats.org/officeDocument/2006/math" xmlns:a14="http://schemas.microsoft.com/office/drawing/2010/main" xmlns:ma14="http://schemas.microsoft.com/office/mac/drawingml/2011/main" val="1"/>
               </a:ext>
             </a:extLst>
           </p:spPr>
@@ -40086,7 +40092,7 @@
           </a:ln>
           <a:extLst>
             <a:ext uri="{C572A759-6A51-4108-AA02-DFA0A04FC94B}">
-              <ma14:wrappingTextBoxFlag xmlns:ma14="http://schemas.microsoft.com/office/mac/drawingml/2011/main" xmlns:a14="http://schemas.microsoft.com/office/drawing/2010/main" xmlns:m="http://schemas.openxmlformats.org/officeDocument/2006/math" xmlns="" val="1"/>
+              <ma14:wrappingTextBoxFlag xmlns="" xmlns:m="http://schemas.openxmlformats.org/officeDocument/2006/math" xmlns:a14="http://schemas.microsoft.com/office/drawing/2010/main" xmlns:ma14="http://schemas.microsoft.com/office/mac/drawingml/2011/main" val="1"/>
             </a:ext>
           </a:extLst>
         </p:spPr>
@@ -40143,7 +40149,7 @@
           </a:ln>
           <a:extLst>
             <a:ext uri="{C572A759-6A51-4108-AA02-DFA0A04FC94B}">
-              <ma14:wrappingTextBoxFlag xmlns:ma14="http://schemas.microsoft.com/office/mac/drawingml/2011/main" xmlns:a14="http://schemas.microsoft.com/office/drawing/2010/main" xmlns:m="http://schemas.openxmlformats.org/officeDocument/2006/math" xmlns="" val="1"/>
+              <ma14:wrappingTextBoxFlag xmlns="" xmlns:m="http://schemas.openxmlformats.org/officeDocument/2006/math" xmlns:a14="http://schemas.microsoft.com/office/drawing/2010/main" xmlns:ma14="http://schemas.microsoft.com/office/mac/drawingml/2011/main" val="1"/>
             </a:ext>
           </a:extLst>
         </p:spPr>
@@ -40227,7 +40233,7 @@
             <a:effectLst/>
             <a:extLst>
               <a:ext uri="{C572A759-6A51-4108-AA02-DFA0A04FC94B}">
-                <ma14:wrappingTextBoxFlag xmlns:ma14="http://schemas.microsoft.com/office/mac/drawingml/2011/main" xmlns:a14="http://schemas.microsoft.com/office/drawing/2010/main" xmlns:m="http://schemas.openxmlformats.org/officeDocument/2006/math" xmlns="" val="1"/>
+                <ma14:wrappingTextBoxFlag xmlns="" xmlns:m="http://schemas.openxmlformats.org/officeDocument/2006/math" xmlns:a14="http://schemas.microsoft.com/office/drawing/2010/main" xmlns:ma14="http://schemas.microsoft.com/office/mac/drawingml/2011/main" val="1"/>
               </a:ext>
             </a:extLst>
           </p:spPr>
@@ -40291,7 +40297,7 @@
             <a:effectLst/>
             <a:extLst>
               <a:ext uri="{C572A759-6A51-4108-AA02-DFA0A04FC94B}">
-                <ma14:wrappingTextBoxFlag xmlns:ma14="http://schemas.microsoft.com/office/mac/drawingml/2011/main" xmlns:a14="http://schemas.microsoft.com/office/drawing/2010/main" xmlns:m="http://schemas.openxmlformats.org/officeDocument/2006/math" xmlns="" val="1"/>
+                <ma14:wrappingTextBoxFlag xmlns="" xmlns:m="http://schemas.openxmlformats.org/officeDocument/2006/math" xmlns:a14="http://schemas.microsoft.com/office/drawing/2010/main" xmlns:ma14="http://schemas.microsoft.com/office/mac/drawingml/2011/main" val="1"/>
               </a:ext>
             </a:extLst>
           </p:spPr>
@@ -40350,7 +40356,7 @@
           </a:ln>
           <a:extLst>
             <a:ext uri="{C572A759-6A51-4108-AA02-DFA0A04FC94B}">
-              <ma14:wrappingTextBoxFlag xmlns:ma14="http://schemas.microsoft.com/office/mac/drawingml/2011/main" xmlns:a14="http://schemas.microsoft.com/office/drawing/2010/main" xmlns:m="http://schemas.openxmlformats.org/officeDocument/2006/math" xmlns="" val="1"/>
+              <ma14:wrappingTextBoxFlag xmlns="" xmlns:m="http://schemas.openxmlformats.org/officeDocument/2006/math" xmlns:a14="http://schemas.microsoft.com/office/drawing/2010/main" xmlns:ma14="http://schemas.microsoft.com/office/mac/drawingml/2011/main" val="1"/>
             </a:ext>
           </a:extLst>
         </p:spPr>
@@ -40429,7 +40435,7 @@
             <a:effectLst/>
             <a:extLst>
               <a:ext uri="{C572A759-6A51-4108-AA02-DFA0A04FC94B}">
-                <ma14:wrappingTextBoxFlag xmlns:ma14="http://schemas.microsoft.com/office/mac/drawingml/2011/main" xmlns:a14="http://schemas.microsoft.com/office/drawing/2010/main" xmlns:m="http://schemas.openxmlformats.org/officeDocument/2006/math" xmlns="" val="1"/>
+                <ma14:wrappingTextBoxFlag xmlns="" xmlns:m="http://schemas.openxmlformats.org/officeDocument/2006/math" xmlns:a14="http://schemas.microsoft.com/office/drawing/2010/main" xmlns:ma14="http://schemas.microsoft.com/office/mac/drawingml/2011/main" val="1"/>
               </a:ext>
             </a:extLst>
           </p:spPr>
@@ -40497,7 +40503,7 @@
             <a:effectLst/>
             <a:extLst>
               <a:ext uri="{C572A759-6A51-4108-AA02-DFA0A04FC94B}">
-                <ma14:wrappingTextBoxFlag xmlns:ma14="http://schemas.microsoft.com/office/mac/drawingml/2011/main" xmlns:a14="http://schemas.microsoft.com/office/drawing/2010/main" xmlns:m="http://schemas.openxmlformats.org/officeDocument/2006/math" xmlns="" val="1"/>
+                <ma14:wrappingTextBoxFlag xmlns="" xmlns:m="http://schemas.openxmlformats.org/officeDocument/2006/math" xmlns:a14="http://schemas.microsoft.com/office/drawing/2010/main" xmlns:ma14="http://schemas.microsoft.com/office/mac/drawingml/2011/main" val="1"/>
               </a:ext>
             </a:extLst>
           </p:spPr>
@@ -40556,7 +40562,7 @@
           </a:ln>
           <a:extLst>
             <a:ext uri="{C572A759-6A51-4108-AA02-DFA0A04FC94B}">
-              <ma14:wrappingTextBoxFlag xmlns:ma14="http://schemas.microsoft.com/office/mac/drawingml/2011/main" xmlns:a14="http://schemas.microsoft.com/office/drawing/2010/main" xmlns:m="http://schemas.openxmlformats.org/officeDocument/2006/math" xmlns="" val="1"/>
+              <ma14:wrappingTextBoxFlag xmlns="" xmlns:m="http://schemas.openxmlformats.org/officeDocument/2006/math" xmlns:a14="http://schemas.microsoft.com/office/drawing/2010/main" xmlns:ma14="http://schemas.microsoft.com/office/mac/drawingml/2011/main" val="1"/>
             </a:ext>
           </a:extLst>
         </p:spPr>
@@ -40635,7 +40641,7 @@
             <a:effectLst/>
             <a:extLst>
               <a:ext uri="{C572A759-6A51-4108-AA02-DFA0A04FC94B}">
-                <ma14:wrappingTextBoxFlag xmlns:ma14="http://schemas.microsoft.com/office/mac/drawingml/2011/main" xmlns:a14="http://schemas.microsoft.com/office/drawing/2010/main" xmlns:m="http://schemas.openxmlformats.org/officeDocument/2006/math" xmlns="" val="1"/>
+                <ma14:wrappingTextBoxFlag xmlns="" xmlns:m="http://schemas.openxmlformats.org/officeDocument/2006/math" xmlns:a14="http://schemas.microsoft.com/office/drawing/2010/main" xmlns:ma14="http://schemas.microsoft.com/office/mac/drawingml/2011/main" val="1"/>
               </a:ext>
             </a:extLst>
           </p:spPr>
@@ -40703,7 +40709,7 @@
             <a:effectLst/>
             <a:extLst>
               <a:ext uri="{C572A759-6A51-4108-AA02-DFA0A04FC94B}">
-                <ma14:wrappingTextBoxFlag xmlns:ma14="http://schemas.microsoft.com/office/mac/drawingml/2011/main" xmlns:a14="http://schemas.microsoft.com/office/drawing/2010/main" xmlns:m="http://schemas.openxmlformats.org/officeDocument/2006/math" xmlns="" val="1"/>
+                <ma14:wrappingTextBoxFlag xmlns="" xmlns:m="http://schemas.openxmlformats.org/officeDocument/2006/math" xmlns:a14="http://schemas.microsoft.com/office/drawing/2010/main" xmlns:ma14="http://schemas.microsoft.com/office/mac/drawingml/2011/main" val="1"/>
               </a:ext>
             </a:extLst>
           </p:spPr>
@@ -40762,7 +40768,7 @@
           </a:ln>
           <a:extLst>
             <a:ext uri="{C572A759-6A51-4108-AA02-DFA0A04FC94B}">
-              <ma14:wrappingTextBoxFlag xmlns:ma14="http://schemas.microsoft.com/office/mac/drawingml/2011/main" xmlns:a14="http://schemas.microsoft.com/office/drawing/2010/main" xmlns:m="http://schemas.openxmlformats.org/officeDocument/2006/math" xmlns="" val="1"/>
+              <ma14:wrappingTextBoxFlag xmlns="" xmlns:m="http://schemas.openxmlformats.org/officeDocument/2006/math" xmlns:a14="http://schemas.microsoft.com/office/drawing/2010/main" xmlns:ma14="http://schemas.microsoft.com/office/mac/drawingml/2011/main" val="1"/>
             </a:ext>
           </a:extLst>
         </p:spPr>
@@ -40841,7 +40847,7 @@
             <a:effectLst/>
             <a:extLst>
               <a:ext uri="{C572A759-6A51-4108-AA02-DFA0A04FC94B}">
-                <ma14:wrappingTextBoxFlag xmlns:ma14="http://schemas.microsoft.com/office/mac/drawingml/2011/main" xmlns:a14="http://schemas.microsoft.com/office/drawing/2010/main" xmlns:m="http://schemas.openxmlformats.org/officeDocument/2006/math" xmlns="" val="1"/>
+                <ma14:wrappingTextBoxFlag xmlns="" xmlns:m="http://schemas.openxmlformats.org/officeDocument/2006/math" xmlns:a14="http://schemas.microsoft.com/office/drawing/2010/main" xmlns:ma14="http://schemas.microsoft.com/office/mac/drawingml/2011/main" val="1"/>
               </a:ext>
             </a:extLst>
           </p:spPr>
@@ -40909,7 +40915,7 @@
             <a:effectLst/>
             <a:extLst>
               <a:ext uri="{C572A759-6A51-4108-AA02-DFA0A04FC94B}">
-                <ma14:wrappingTextBoxFlag xmlns:ma14="http://schemas.microsoft.com/office/mac/drawingml/2011/main" xmlns:a14="http://schemas.microsoft.com/office/drawing/2010/main" xmlns:m="http://schemas.openxmlformats.org/officeDocument/2006/math" xmlns="" val="1"/>
+                <ma14:wrappingTextBoxFlag xmlns="" xmlns:m="http://schemas.openxmlformats.org/officeDocument/2006/math" xmlns:a14="http://schemas.microsoft.com/office/drawing/2010/main" xmlns:ma14="http://schemas.microsoft.com/office/mac/drawingml/2011/main" val="1"/>
               </a:ext>
             </a:extLst>
           </p:spPr>
@@ -40968,7 +40974,7 @@
           </a:ln>
           <a:extLst>
             <a:ext uri="{C572A759-6A51-4108-AA02-DFA0A04FC94B}">
-              <ma14:wrappingTextBoxFlag xmlns:ma14="http://schemas.microsoft.com/office/mac/drawingml/2011/main" xmlns:a14="http://schemas.microsoft.com/office/drawing/2010/main" xmlns:m="http://schemas.openxmlformats.org/officeDocument/2006/math" xmlns="" val="1"/>
+              <ma14:wrappingTextBoxFlag xmlns="" xmlns:m="http://schemas.openxmlformats.org/officeDocument/2006/math" xmlns:a14="http://schemas.microsoft.com/office/drawing/2010/main" xmlns:ma14="http://schemas.microsoft.com/office/mac/drawingml/2011/main" val="1"/>
             </a:ext>
           </a:extLst>
         </p:spPr>
@@ -41047,7 +41053,7 @@
             <a:effectLst/>
             <a:extLst>
               <a:ext uri="{C572A759-6A51-4108-AA02-DFA0A04FC94B}">
-                <ma14:wrappingTextBoxFlag xmlns:ma14="http://schemas.microsoft.com/office/mac/drawingml/2011/main" xmlns:a14="http://schemas.microsoft.com/office/drawing/2010/main" xmlns:m="http://schemas.openxmlformats.org/officeDocument/2006/math" xmlns="" val="1"/>
+                <ma14:wrappingTextBoxFlag xmlns="" xmlns:m="http://schemas.openxmlformats.org/officeDocument/2006/math" xmlns:a14="http://schemas.microsoft.com/office/drawing/2010/main" xmlns:ma14="http://schemas.microsoft.com/office/mac/drawingml/2011/main" val="1"/>
               </a:ext>
             </a:extLst>
           </p:spPr>
@@ -41111,7 +41117,7 @@
             <a:effectLst/>
             <a:extLst>
               <a:ext uri="{C572A759-6A51-4108-AA02-DFA0A04FC94B}">
-                <ma14:wrappingTextBoxFlag xmlns:ma14="http://schemas.microsoft.com/office/mac/drawingml/2011/main" xmlns:a14="http://schemas.microsoft.com/office/drawing/2010/main" xmlns:m="http://schemas.openxmlformats.org/officeDocument/2006/math" xmlns="" val="1"/>
+                <ma14:wrappingTextBoxFlag xmlns="" xmlns:m="http://schemas.openxmlformats.org/officeDocument/2006/math" xmlns:a14="http://schemas.microsoft.com/office/drawing/2010/main" xmlns:ma14="http://schemas.microsoft.com/office/mac/drawingml/2011/main" val="1"/>
               </a:ext>
             </a:extLst>
           </p:spPr>
@@ -41170,7 +41176,7 @@
           </a:ln>
           <a:extLst>
             <a:ext uri="{C572A759-6A51-4108-AA02-DFA0A04FC94B}">
-              <ma14:wrappingTextBoxFlag xmlns:ma14="http://schemas.microsoft.com/office/mac/drawingml/2011/main" xmlns:a14="http://schemas.microsoft.com/office/drawing/2010/main" xmlns:m="http://schemas.openxmlformats.org/officeDocument/2006/math" xmlns="" val="1"/>
+              <ma14:wrappingTextBoxFlag xmlns="" xmlns:m="http://schemas.openxmlformats.org/officeDocument/2006/math" xmlns:a14="http://schemas.microsoft.com/office/drawing/2010/main" xmlns:ma14="http://schemas.microsoft.com/office/mac/drawingml/2011/main" val="1"/>
             </a:ext>
           </a:extLst>
         </p:spPr>
@@ -42267,7 +42273,7 @@
           </a:ln>
           <a:extLst>
             <a:ext uri="{C572A759-6A51-4108-AA02-DFA0A04FC94B}">
-              <ma14:wrappingTextBoxFlag xmlns="" xmlns:m="http://schemas.openxmlformats.org/officeDocument/2006/math" xmlns:a14="http://schemas.microsoft.com/office/drawing/2010/main" xmlns:ma14="http://schemas.microsoft.com/office/mac/drawingml/2011/main" val="1"/>
+              <ma14:wrappingTextBoxFlag xmlns:ma14="http://schemas.microsoft.com/office/mac/drawingml/2011/main" xmlns:a14="http://schemas.microsoft.com/office/drawing/2010/main" xmlns:m="http://schemas.openxmlformats.org/officeDocument/2006/math" xmlns="" val="1"/>
             </a:ext>
           </a:extLst>
         </p:spPr>
@@ -42557,7 +42563,7 @@
           </a:ln>
           <a:extLst>
             <a:ext uri="{C572A759-6A51-4108-AA02-DFA0A04FC94B}">
-              <ma14:wrappingTextBoxFlag xmlns="" xmlns:m="http://schemas.openxmlformats.org/officeDocument/2006/math" xmlns:a14="http://schemas.microsoft.com/office/drawing/2010/main" xmlns:ma14="http://schemas.microsoft.com/office/mac/drawingml/2011/main" val="1"/>
+              <ma14:wrappingTextBoxFlag xmlns:ma14="http://schemas.microsoft.com/office/mac/drawingml/2011/main" xmlns:a14="http://schemas.microsoft.com/office/drawing/2010/main" xmlns:m="http://schemas.openxmlformats.org/officeDocument/2006/math" xmlns="" val="1"/>
             </a:ext>
           </a:extLst>
         </p:spPr>

</xml_diff>

<commit_message>
fixed disastrous typo in L4.2S10
</commit_message>
<xml_diff>
--- a/Slides/Lesson 4.2 Asynchronous Programming.pptx
+++ b/Slides/Lesson 4.2 Asynchronous Programming.pptx
@@ -3162,7 +3162,7 @@
           <a:p>
             <a:fld id="{5D2A64DE-480B-420F-9649-4F8E696E08E0}" type="datetime1">
               <a:rPr lang="en-US" smtClean="0"/>
-              <a:t>2/9/22</a:t>
+              <a:t>2/9/2022</a:t>
             </a:fld>
             <a:endParaRPr lang="en-US"/>
           </a:p>
@@ -3416,7 +3416,7 @@
           <a:p>
             <a:fld id="{07C7BFD4-467E-4EDE-93EA-052F5B39A4E5}" type="datetime1">
               <a:rPr lang="en-US" smtClean="0"/>
-              <a:t>2/9/22</a:t>
+              <a:t>2/9/2022</a:t>
             </a:fld>
             <a:endParaRPr lang="en-US"/>
           </a:p>
@@ -5593,7 +5593,7 @@
           <a:p>
             <a:fld id="{07C7BFD4-467E-4EDE-93EA-052F5B39A4E5}" type="datetime1">
               <a:rPr lang="en-US" smtClean="0"/>
-              <a:t>2/9/22</a:t>
+              <a:t>2/9/2022</a:t>
             </a:fld>
             <a:endParaRPr lang="en-US"/>
           </a:p>
@@ -8185,7 +8185,7 @@
           <a:p>
             <a:fld id="{5D2A64DE-480B-420F-9649-4F8E696E08E0}" type="datetime1">
               <a:rPr lang="en-US" smtClean="0"/>
-              <a:t>2/9/22</a:t>
+              <a:t>2/9/2022</a:t>
             </a:fld>
             <a:endParaRPr lang="en-US"/>
           </a:p>
@@ -8439,7 +8439,7 @@
           <a:p>
             <a:fld id="{07C7BFD4-467E-4EDE-93EA-052F5B39A4E5}" type="datetime1">
               <a:rPr lang="en-US" smtClean="0"/>
-              <a:t>2/9/22</a:t>
+              <a:t>2/9/2022</a:t>
             </a:fld>
             <a:endParaRPr lang="en-US"/>
           </a:p>
@@ -10694,7 +10694,7 @@
           <a:p>
             <a:fld id="{07C7BFD4-467E-4EDE-93EA-052F5B39A4E5}" type="datetime1">
               <a:rPr lang="en-US" smtClean="0"/>
-              <a:t>2/9/22</a:t>
+              <a:t>2/9/2022</a:t>
             </a:fld>
             <a:endParaRPr lang="en-US"/>
           </a:p>
@@ -11593,7 +11593,7 @@
           </a:ln>
           <a:extLst>
             <a:ext uri="{C572A759-6A51-4108-AA02-DFA0A04FC94B}">
-              <ma14:wrappingTextBoxFlag xmlns="" xmlns:m="http://schemas.openxmlformats.org/officeDocument/2006/math" xmlns:a14="http://schemas.microsoft.com/office/drawing/2010/main" xmlns:ma14="http://schemas.microsoft.com/office/mac/drawingml/2011/main" val="1"/>
+              <ma14:wrappingTextBoxFlag xmlns:ma14="http://schemas.microsoft.com/office/mac/drawingml/2011/main" xmlns:a14="http://schemas.microsoft.com/office/drawing/2010/main" xmlns:m="http://schemas.openxmlformats.org/officeDocument/2006/math" xmlns="" val="1"/>
             </a:ext>
           </a:extLst>
         </p:spPr>
@@ -11633,7 +11633,7 @@
           </a:ln>
           <a:extLst>
             <a:ext uri="{C572A759-6A51-4108-AA02-DFA0A04FC94B}">
-              <ma14:wrappingTextBoxFlag xmlns="" xmlns:m="http://schemas.openxmlformats.org/officeDocument/2006/math" xmlns:a14="http://schemas.microsoft.com/office/drawing/2010/main" xmlns:ma14="http://schemas.microsoft.com/office/mac/drawingml/2011/main" val="1"/>
+              <ma14:wrappingTextBoxFlag xmlns:ma14="http://schemas.microsoft.com/office/mac/drawingml/2011/main" xmlns:a14="http://schemas.microsoft.com/office/drawing/2010/main" xmlns:m="http://schemas.openxmlformats.org/officeDocument/2006/math" xmlns="" val="1"/>
             </a:ext>
           </a:extLst>
         </p:spPr>
@@ -12500,7 +12500,7 @@
           </a:ln>
           <a:extLst>
             <a:ext uri="{C572A759-6A51-4108-AA02-DFA0A04FC94B}">
-              <ma14:wrappingTextBoxFlag xmlns:ma14="http://schemas.microsoft.com/office/mac/drawingml/2011/main" xmlns:a14="http://schemas.microsoft.com/office/drawing/2010/main" xmlns:m="http://schemas.openxmlformats.org/officeDocument/2006/math" xmlns="" val="1"/>
+              <ma14:wrappingTextBoxFlag xmlns="" xmlns:m="http://schemas.openxmlformats.org/officeDocument/2006/math" xmlns:a14="http://schemas.microsoft.com/office/drawing/2010/main" xmlns:ma14="http://schemas.microsoft.com/office/mac/drawingml/2011/main" val="1"/>
             </a:ext>
           </a:extLst>
         </p:spPr>
@@ -12540,7 +12540,7 @@
           </a:ln>
           <a:extLst>
             <a:ext uri="{C572A759-6A51-4108-AA02-DFA0A04FC94B}">
-              <ma14:wrappingTextBoxFlag xmlns:ma14="http://schemas.microsoft.com/office/mac/drawingml/2011/main" xmlns:a14="http://schemas.microsoft.com/office/drawing/2010/main" xmlns:m="http://schemas.openxmlformats.org/officeDocument/2006/math" xmlns="" val="1"/>
+              <ma14:wrappingTextBoxFlag xmlns="" xmlns:m="http://schemas.openxmlformats.org/officeDocument/2006/math" xmlns:a14="http://schemas.microsoft.com/office/drawing/2010/main" xmlns:ma14="http://schemas.microsoft.com/office/mac/drawingml/2011/main" val="1"/>
             </a:ext>
           </a:extLst>
         </p:spPr>
@@ -13660,7 +13660,7 @@
           <a:p>
             <a:r>
               <a:rPr lang="en-US" dirty="0"/>
-              <a:t>Don’t Perform Long-Running Computation in Asynchronous Code</a:t>
+              <a:t>Don’t Perform Long-Running Computation in Synchronous Code</a:t>
             </a:r>
             <a:endParaRPr dirty="0"/>
           </a:p>
@@ -13688,7 +13688,7 @@
           </a:ln>
           <a:extLst>
             <a:ext uri="{C572A759-6A51-4108-AA02-DFA0A04FC94B}">
-              <ma14:wrappingTextBoxFlag xmlns:ma14="http://schemas.microsoft.com/office/mac/drawingml/2011/main" xmlns:a14="http://schemas.microsoft.com/office/drawing/2010/main" xmlns:m="http://schemas.openxmlformats.org/officeDocument/2006/math" xmlns="" val="1"/>
+              <ma14:wrappingTextBoxFlag xmlns="" xmlns:m="http://schemas.openxmlformats.org/officeDocument/2006/math" xmlns:a14="http://schemas.microsoft.com/office/drawing/2010/main" xmlns:ma14="http://schemas.microsoft.com/office/mac/drawingml/2011/main" val="1"/>
             </a:ext>
           </a:extLst>
         </p:spPr>
@@ -14458,7 +14458,7 @@
             <a:effectLst/>
             <a:extLst>
               <a:ext uri="{C572A759-6A51-4108-AA02-DFA0A04FC94B}">
-                <ma14:wrappingTextBoxFlag xmlns:ma14="http://schemas.microsoft.com/office/mac/drawingml/2011/main" xmlns:a14="http://schemas.microsoft.com/office/drawing/2010/main" xmlns:m="http://schemas.openxmlformats.org/officeDocument/2006/math" xmlns="" val="1"/>
+                <ma14:wrappingTextBoxFlag xmlns="" xmlns:m="http://schemas.openxmlformats.org/officeDocument/2006/math" xmlns:a14="http://schemas.microsoft.com/office/drawing/2010/main" xmlns:ma14="http://schemas.microsoft.com/office/mac/drawingml/2011/main" val="1"/>
               </a:ext>
             </a:extLst>
           </p:spPr>
@@ -14503,7 +14503,7 @@
             <a:effectLst/>
             <a:extLst>
               <a:ext uri="{C572A759-6A51-4108-AA02-DFA0A04FC94B}">
-                <ma14:wrappingTextBoxFlag xmlns:ma14="http://schemas.microsoft.com/office/mac/drawingml/2011/main" xmlns:a14="http://schemas.microsoft.com/office/drawing/2010/main" xmlns:m="http://schemas.openxmlformats.org/officeDocument/2006/math" xmlns="" val="1"/>
+                <ma14:wrappingTextBoxFlag xmlns="" xmlns:m="http://schemas.openxmlformats.org/officeDocument/2006/math" xmlns:a14="http://schemas.microsoft.com/office/drawing/2010/main" xmlns:ma14="http://schemas.microsoft.com/office/mac/drawingml/2011/main" val="1"/>
               </a:ext>
             </a:extLst>
           </p:spPr>
@@ -14563,7 +14563,7 @@
             <a:effectLst/>
             <a:extLst>
               <a:ext uri="{C572A759-6A51-4108-AA02-DFA0A04FC94B}">
-                <ma14:wrappingTextBoxFlag xmlns:ma14="http://schemas.microsoft.com/office/mac/drawingml/2011/main" xmlns:a14="http://schemas.microsoft.com/office/drawing/2010/main" xmlns:m="http://schemas.openxmlformats.org/officeDocument/2006/math" xmlns="" val="1"/>
+                <ma14:wrappingTextBoxFlag xmlns="" xmlns:m="http://schemas.openxmlformats.org/officeDocument/2006/math" xmlns:a14="http://schemas.microsoft.com/office/drawing/2010/main" xmlns:ma14="http://schemas.microsoft.com/office/mac/drawingml/2011/main" val="1"/>
               </a:ext>
             </a:extLst>
           </p:spPr>
@@ -14825,7 +14825,7 @@
             <a:effectLst/>
             <a:extLst>
               <a:ext uri="{C572A759-6A51-4108-AA02-DFA0A04FC94B}">
-                <ma14:wrappingTextBoxFlag xmlns:ma14="http://schemas.microsoft.com/office/mac/drawingml/2011/main" xmlns:a14="http://schemas.microsoft.com/office/drawing/2010/main" xmlns:m="http://schemas.openxmlformats.org/officeDocument/2006/math" xmlns="" val="1"/>
+                <ma14:wrappingTextBoxFlag xmlns="" xmlns:m="http://schemas.openxmlformats.org/officeDocument/2006/math" xmlns:a14="http://schemas.microsoft.com/office/drawing/2010/main" xmlns:ma14="http://schemas.microsoft.com/office/mac/drawingml/2011/main" val="1"/>
               </a:ext>
             </a:extLst>
           </p:spPr>
@@ -15091,7 +15091,7 @@
               <a:effectLst/>
               <a:extLst>
                 <a:ext uri="{C572A759-6A51-4108-AA02-DFA0A04FC94B}">
-                  <ma14:wrappingTextBoxFlag xmlns:ma14="http://schemas.microsoft.com/office/mac/drawingml/2011/main" xmlns:a14="http://schemas.microsoft.com/office/drawing/2010/main" xmlns:m="http://schemas.openxmlformats.org/officeDocument/2006/math" xmlns="" val="1"/>
+                  <ma14:wrappingTextBoxFlag xmlns="" xmlns:m="http://schemas.openxmlformats.org/officeDocument/2006/math" xmlns:a14="http://schemas.microsoft.com/office/drawing/2010/main" xmlns:ma14="http://schemas.microsoft.com/office/mac/drawingml/2011/main" val="1"/>
                 </a:ext>
               </a:extLst>
             </p:spPr>
@@ -15655,7 +15655,7 @@
             <a:effectLst/>
             <a:extLst>
               <a:ext uri="{C572A759-6A51-4108-AA02-DFA0A04FC94B}">
-                <ma14:wrappingTextBoxFlag xmlns:ma14="http://schemas.microsoft.com/office/mac/drawingml/2011/main" xmlns:a14="http://schemas.microsoft.com/office/drawing/2010/main" xmlns:m="http://schemas.openxmlformats.org/officeDocument/2006/math" xmlns="" val="1"/>
+                <ma14:wrappingTextBoxFlag xmlns="" xmlns:m="http://schemas.openxmlformats.org/officeDocument/2006/math" xmlns:a14="http://schemas.microsoft.com/office/drawing/2010/main" xmlns:ma14="http://schemas.microsoft.com/office/mac/drawingml/2011/main" val="1"/>
               </a:ext>
             </a:extLst>
           </p:spPr>
@@ -16939,7 +16939,7 @@
           </a:prstGeom>
           <a:extLst>
             <a:ext uri="{C572A759-6A51-4108-AA02-DFA0A04FC94B}">
-              <ma14:wrappingTextBoxFlag xmlns:ma14="http://schemas.microsoft.com/office/mac/drawingml/2011/main" xmlns:a14="http://schemas.microsoft.com/office/drawing/2010/main" xmlns:m="http://schemas.openxmlformats.org/officeDocument/2006/math" xmlns="" val="1"/>
+              <ma14:wrappingTextBoxFlag xmlns="" xmlns:m="http://schemas.openxmlformats.org/officeDocument/2006/math" xmlns:a14="http://schemas.microsoft.com/office/drawing/2010/main" xmlns:ma14="http://schemas.microsoft.com/office/mac/drawingml/2011/main" val="1"/>
             </a:ext>
           </a:extLst>
         </p:spPr>
@@ -16980,7 +16980,7 @@
           </a:ln>
           <a:extLst>
             <a:ext uri="{C572A759-6A51-4108-AA02-DFA0A04FC94B}">
-              <ma14:wrappingTextBoxFlag xmlns:ma14="http://schemas.microsoft.com/office/mac/drawingml/2011/main" xmlns:a14="http://schemas.microsoft.com/office/drawing/2010/main" xmlns:m="http://schemas.openxmlformats.org/officeDocument/2006/math" xmlns="" val="1"/>
+              <ma14:wrappingTextBoxFlag xmlns="" xmlns:m="http://schemas.openxmlformats.org/officeDocument/2006/math" xmlns:a14="http://schemas.microsoft.com/office/drawing/2010/main" xmlns:ma14="http://schemas.microsoft.com/office/mac/drawingml/2011/main" val="1"/>
             </a:ext>
           </a:extLst>
         </p:spPr>
@@ -20335,7 +20335,7 @@
           </a:prstGeom>
           <a:extLst>
             <a:ext uri="{C572A759-6A51-4108-AA02-DFA0A04FC94B}">
-              <ma14:wrappingTextBoxFlag xmlns="" xmlns:m="http://schemas.openxmlformats.org/officeDocument/2006/math" xmlns:a14="http://schemas.microsoft.com/office/drawing/2010/main" xmlns:ma14="http://schemas.microsoft.com/office/mac/drawingml/2011/main" val="1"/>
+              <ma14:wrappingTextBoxFlag xmlns:ma14="http://schemas.microsoft.com/office/mac/drawingml/2011/main" xmlns:a14="http://schemas.microsoft.com/office/drawing/2010/main" xmlns:m="http://schemas.openxmlformats.org/officeDocument/2006/math" xmlns="" val="1"/>
             </a:ext>
           </a:extLst>
         </p:spPr>
@@ -20372,7 +20372,7 @@
           </a:ln>
           <a:extLst>
             <a:ext uri="{C572A759-6A51-4108-AA02-DFA0A04FC94B}">
-              <ma14:wrappingTextBoxFlag xmlns="" xmlns:m="http://schemas.openxmlformats.org/officeDocument/2006/math" xmlns:a14="http://schemas.microsoft.com/office/drawing/2010/main" xmlns:ma14="http://schemas.microsoft.com/office/mac/drawingml/2011/main" val="1"/>
+              <ma14:wrappingTextBoxFlag xmlns:ma14="http://schemas.microsoft.com/office/mac/drawingml/2011/main" xmlns:a14="http://schemas.microsoft.com/office/drawing/2010/main" xmlns:m="http://schemas.openxmlformats.org/officeDocument/2006/math" xmlns="" val="1"/>
             </a:ext>
           </a:extLst>
         </p:spPr>
@@ -21132,7 +21132,7 @@
             <a:effectLst/>
             <a:extLst>
               <a:ext uri="{C572A759-6A51-4108-AA02-DFA0A04FC94B}">
-                <ma14:wrappingTextBoxFlag xmlns:ma14="http://schemas.microsoft.com/office/mac/drawingml/2011/main" xmlns:a14="http://schemas.microsoft.com/office/drawing/2010/main" xmlns:m="http://schemas.openxmlformats.org/officeDocument/2006/math" xmlns="" val="1"/>
+                <ma14:wrappingTextBoxFlag xmlns="" xmlns:m="http://schemas.openxmlformats.org/officeDocument/2006/math" xmlns:a14="http://schemas.microsoft.com/office/drawing/2010/main" xmlns:ma14="http://schemas.microsoft.com/office/mac/drawingml/2011/main" val="1"/>
               </a:ext>
             </a:extLst>
           </p:spPr>
@@ -21415,7 +21415,7 @@
             <a:effectLst/>
             <a:extLst>
               <a:ext uri="{C572A759-6A51-4108-AA02-DFA0A04FC94B}">
-                <ma14:wrappingTextBoxFlag xmlns:ma14="http://schemas.microsoft.com/office/mac/drawingml/2011/main" xmlns:a14="http://schemas.microsoft.com/office/drawing/2010/main" xmlns:m="http://schemas.openxmlformats.org/officeDocument/2006/math" xmlns="" val="1"/>
+                <ma14:wrappingTextBoxFlag xmlns="" xmlns:m="http://schemas.openxmlformats.org/officeDocument/2006/math" xmlns:a14="http://schemas.microsoft.com/office/drawing/2010/main" xmlns:ma14="http://schemas.microsoft.com/office/mac/drawingml/2011/main" val="1"/>
               </a:ext>
             </a:extLst>
           </p:spPr>
@@ -22549,7 +22549,7 @@
             <a:effectLst/>
             <a:extLst>
               <a:ext uri="{C572A759-6A51-4108-AA02-DFA0A04FC94B}">
-                <ma14:wrappingTextBoxFlag xmlns="" xmlns:m="http://schemas.openxmlformats.org/officeDocument/2006/math" xmlns:a14="http://schemas.microsoft.com/office/drawing/2010/main" xmlns:ma14="http://schemas.microsoft.com/office/mac/drawingml/2011/main" val="1"/>
+                <ma14:wrappingTextBoxFlag xmlns:ma14="http://schemas.microsoft.com/office/mac/drawingml/2011/main" xmlns:a14="http://schemas.microsoft.com/office/drawing/2010/main" xmlns:m="http://schemas.openxmlformats.org/officeDocument/2006/math" xmlns="" val="1"/>
               </a:ext>
             </a:extLst>
           </p:spPr>
@@ -22814,7 +22814,7 @@
             <a:effectLst/>
             <a:extLst>
               <a:ext uri="{C572A759-6A51-4108-AA02-DFA0A04FC94B}">
-                <ma14:wrappingTextBoxFlag xmlns="" xmlns:m="http://schemas.openxmlformats.org/officeDocument/2006/math" xmlns:a14="http://schemas.microsoft.com/office/drawing/2010/main" xmlns:ma14="http://schemas.microsoft.com/office/mac/drawingml/2011/main" val="1"/>
+                <ma14:wrappingTextBoxFlag xmlns:ma14="http://schemas.microsoft.com/office/mac/drawingml/2011/main" xmlns:a14="http://schemas.microsoft.com/office/drawing/2010/main" xmlns:m="http://schemas.openxmlformats.org/officeDocument/2006/math" xmlns="" val="1"/>
               </a:ext>
             </a:extLst>
           </p:spPr>
@@ -24254,7 +24254,7 @@
             <a:effectLst/>
             <a:extLst>
               <a:ext uri="{C572A759-6A51-4108-AA02-DFA0A04FC94B}">
-                <ma14:wrappingTextBoxFlag xmlns:ma14="http://schemas.microsoft.com/office/mac/drawingml/2011/main" xmlns:a14="http://schemas.microsoft.com/office/drawing/2010/main" xmlns:m="http://schemas.openxmlformats.org/officeDocument/2006/math" xmlns="" val="1"/>
+                <ma14:wrappingTextBoxFlag xmlns="" xmlns:m="http://schemas.openxmlformats.org/officeDocument/2006/math" xmlns:a14="http://schemas.microsoft.com/office/drawing/2010/main" xmlns:ma14="http://schemas.microsoft.com/office/mac/drawingml/2011/main" val="1"/>
               </a:ext>
             </a:extLst>
           </p:spPr>
@@ -28704,7 +28704,7 @@
             <a:effectLst/>
             <a:extLst>
               <a:ext uri="{C572A759-6A51-4108-AA02-DFA0A04FC94B}">
-                <ma14:wrappingTextBoxFlag xmlns:ma14="http://schemas.microsoft.com/office/mac/drawingml/2011/main" xmlns:a14="http://schemas.microsoft.com/office/drawing/2010/main" xmlns:m="http://schemas.openxmlformats.org/officeDocument/2006/math" xmlns="" val="1"/>
+                <ma14:wrappingTextBoxFlag xmlns="" xmlns:m="http://schemas.openxmlformats.org/officeDocument/2006/math" xmlns:a14="http://schemas.microsoft.com/office/drawing/2010/main" xmlns:ma14="http://schemas.microsoft.com/office/mac/drawingml/2011/main" val="1"/>
               </a:ext>
             </a:extLst>
           </p:spPr>
@@ -29007,7 +29007,7 @@
           </a:prstGeom>
           <a:extLst>
             <a:ext uri="{C572A759-6A51-4108-AA02-DFA0A04FC94B}">
-              <ma14:wrappingTextBoxFlag xmlns:ma14="http://schemas.microsoft.com/office/mac/drawingml/2011/main" xmlns:a14="http://schemas.microsoft.com/office/drawing/2010/main" xmlns:m="http://schemas.openxmlformats.org/officeDocument/2006/math" xmlns="" val="1"/>
+              <ma14:wrappingTextBoxFlag xmlns="" xmlns:m="http://schemas.openxmlformats.org/officeDocument/2006/math" xmlns:a14="http://schemas.microsoft.com/office/drawing/2010/main" xmlns:ma14="http://schemas.microsoft.com/office/mac/drawingml/2011/main" val="1"/>
             </a:ext>
           </a:extLst>
         </p:spPr>
@@ -29045,7 +29045,7 @@
           </a:ln>
           <a:extLst>
             <a:ext uri="{C572A759-6A51-4108-AA02-DFA0A04FC94B}">
-              <ma14:wrappingTextBoxFlag xmlns:ma14="http://schemas.microsoft.com/office/mac/drawingml/2011/main" xmlns:a14="http://schemas.microsoft.com/office/drawing/2010/main" xmlns:m="http://schemas.openxmlformats.org/officeDocument/2006/math" xmlns="" val="1"/>
+              <ma14:wrappingTextBoxFlag xmlns="" xmlns:m="http://schemas.openxmlformats.org/officeDocument/2006/math" xmlns:a14="http://schemas.microsoft.com/office/drawing/2010/main" xmlns:ma14="http://schemas.microsoft.com/office/mac/drawingml/2011/main" val="1"/>
             </a:ext>
           </a:extLst>
         </p:spPr>
@@ -30112,7 +30112,7 @@
           </a:ln>
           <a:extLst>
             <a:ext uri="{C572A759-6A51-4108-AA02-DFA0A04FC94B}">
-              <ma14:wrappingTextBoxFlag xmlns:ma14="http://schemas.microsoft.com/office/mac/drawingml/2011/main" xmlns:a14="http://schemas.microsoft.com/office/drawing/2010/main" xmlns:m="http://schemas.openxmlformats.org/officeDocument/2006/math" xmlns="" val="1"/>
+              <ma14:wrappingTextBoxFlag xmlns="" xmlns:m="http://schemas.openxmlformats.org/officeDocument/2006/math" xmlns:a14="http://schemas.microsoft.com/office/drawing/2010/main" xmlns:ma14="http://schemas.microsoft.com/office/mac/drawingml/2011/main" val="1"/>
             </a:ext>
           </a:extLst>
         </p:spPr>
@@ -31144,7 +31144,7 @@
           </a:ln>
           <a:extLst>
             <a:ext uri="{C572A759-6A51-4108-AA02-DFA0A04FC94B}">
-              <ma14:wrappingTextBoxFlag xmlns:ma14="http://schemas.microsoft.com/office/mac/drawingml/2011/main" xmlns:a14="http://schemas.microsoft.com/office/drawing/2010/main" xmlns:m="http://schemas.openxmlformats.org/officeDocument/2006/math" xmlns="" val="1"/>
+              <ma14:wrappingTextBoxFlag xmlns="" xmlns:m="http://schemas.openxmlformats.org/officeDocument/2006/math" xmlns:a14="http://schemas.microsoft.com/office/drawing/2010/main" xmlns:ma14="http://schemas.microsoft.com/office/mac/drawingml/2011/main" val="1"/>
             </a:ext>
           </a:extLst>
         </p:spPr>
@@ -31202,7 +31202,7 @@
           </a:ln>
           <a:extLst>
             <a:ext uri="{C572A759-6A51-4108-AA02-DFA0A04FC94B}">
-              <ma14:wrappingTextBoxFlag xmlns:ma14="http://schemas.microsoft.com/office/mac/drawingml/2011/main" xmlns:a14="http://schemas.microsoft.com/office/drawing/2010/main" xmlns:m="http://schemas.openxmlformats.org/officeDocument/2006/math" xmlns="" val="1"/>
+              <ma14:wrappingTextBoxFlag xmlns="" xmlns:m="http://schemas.openxmlformats.org/officeDocument/2006/math" xmlns:a14="http://schemas.microsoft.com/office/drawing/2010/main" xmlns:ma14="http://schemas.microsoft.com/office/mac/drawingml/2011/main" val="1"/>
             </a:ext>
           </a:extLst>
         </p:spPr>
@@ -31246,7 +31246,7 @@
           </a:ln>
           <a:extLst>
             <a:ext uri="{C572A759-6A51-4108-AA02-DFA0A04FC94B}">
-              <ma14:wrappingTextBoxFlag xmlns:ma14="http://schemas.microsoft.com/office/mac/drawingml/2011/main" xmlns:a14="http://schemas.microsoft.com/office/drawing/2010/main" xmlns:m="http://schemas.openxmlformats.org/officeDocument/2006/math" xmlns="" val="1"/>
+              <ma14:wrappingTextBoxFlag xmlns="" xmlns:m="http://schemas.openxmlformats.org/officeDocument/2006/math" xmlns:a14="http://schemas.microsoft.com/office/drawing/2010/main" xmlns:ma14="http://schemas.microsoft.com/office/mac/drawingml/2011/main" val="1"/>
             </a:ext>
           </a:extLst>
         </p:spPr>
@@ -31282,7 +31282,7 @@
           </a:ln>
           <a:extLst>
             <a:ext uri="{C572A759-6A51-4108-AA02-DFA0A04FC94B}">
-              <ma14:wrappingTextBoxFlag xmlns:ma14="http://schemas.microsoft.com/office/mac/drawingml/2011/main" xmlns:a14="http://schemas.microsoft.com/office/drawing/2010/main" xmlns:m="http://schemas.openxmlformats.org/officeDocument/2006/math" xmlns="" val="1"/>
+              <ma14:wrappingTextBoxFlag xmlns="" xmlns:m="http://schemas.openxmlformats.org/officeDocument/2006/math" xmlns:a14="http://schemas.microsoft.com/office/drawing/2010/main" xmlns:ma14="http://schemas.microsoft.com/office/mac/drawingml/2011/main" val="1"/>
             </a:ext>
           </a:extLst>
         </p:spPr>
@@ -31370,7 +31370,7 @@
             <a:effectLst/>
             <a:extLst>
               <a:ext uri="{C572A759-6A51-4108-AA02-DFA0A04FC94B}">
-                <ma14:wrappingTextBoxFlag xmlns:ma14="http://schemas.microsoft.com/office/mac/drawingml/2011/main" xmlns:a14="http://schemas.microsoft.com/office/drawing/2010/main" xmlns:m="http://schemas.openxmlformats.org/officeDocument/2006/math" xmlns="" val="1"/>
+                <ma14:wrappingTextBoxFlag xmlns="" xmlns:m="http://schemas.openxmlformats.org/officeDocument/2006/math" xmlns:a14="http://schemas.microsoft.com/office/drawing/2010/main" xmlns:ma14="http://schemas.microsoft.com/office/mac/drawingml/2011/main" val="1"/>
               </a:ext>
             </a:extLst>
           </p:spPr>
@@ -31632,7 +31632,7 @@
             <a:effectLst/>
             <a:extLst>
               <a:ext uri="{C572A759-6A51-4108-AA02-DFA0A04FC94B}">
-                <ma14:wrappingTextBoxFlag xmlns:ma14="http://schemas.microsoft.com/office/mac/drawingml/2011/main" xmlns:a14="http://schemas.microsoft.com/office/drawing/2010/main" xmlns:m="http://schemas.openxmlformats.org/officeDocument/2006/math" xmlns="" val="1"/>
+                <ma14:wrappingTextBoxFlag xmlns="" xmlns:m="http://schemas.openxmlformats.org/officeDocument/2006/math" xmlns:a14="http://schemas.microsoft.com/office/drawing/2010/main" xmlns:ma14="http://schemas.microsoft.com/office/mac/drawingml/2011/main" val="1"/>
               </a:ext>
             </a:extLst>
           </p:spPr>
@@ -32588,7 +32588,7 @@
           </a:prstGeom>
           <a:extLst>
             <a:ext uri="{C572A759-6A51-4108-AA02-DFA0A04FC94B}">
-              <ma14:wrappingTextBoxFlag xmlns:ma14="http://schemas.microsoft.com/office/mac/drawingml/2011/main" xmlns:a14="http://schemas.microsoft.com/office/drawing/2010/main" xmlns:m="http://schemas.openxmlformats.org/officeDocument/2006/math" xmlns="" val="1"/>
+              <ma14:wrappingTextBoxFlag xmlns="" xmlns:m="http://schemas.openxmlformats.org/officeDocument/2006/math" xmlns:a14="http://schemas.microsoft.com/office/drawing/2010/main" xmlns:ma14="http://schemas.microsoft.com/office/mac/drawingml/2011/main" val="1"/>
             </a:ext>
           </a:extLst>
         </p:spPr>
@@ -32739,7 +32739,7 @@
           </a:ln>
           <a:extLst>
             <a:ext uri="{C572A759-6A51-4108-AA02-DFA0A04FC94B}">
-              <ma14:wrappingTextBoxFlag xmlns:ma14="http://schemas.microsoft.com/office/mac/drawingml/2011/main" xmlns:a14="http://schemas.microsoft.com/office/drawing/2010/main" xmlns:m="http://schemas.openxmlformats.org/officeDocument/2006/math" xmlns="" val="1"/>
+              <ma14:wrappingTextBoxFlag xmlns="" xmlns:m="http://schemas.openxmlformats.org/officeDocument/2006/math" xmlns:a14="http://schemas.microsoft.com/office/drawing/2010/main" xmlns:ma14="http://schemas.microsoft.com/office/mac/drawingml/2011/main" val="1"/>
             </a:ext>
           </a:extLst>
         </p:spPr>
@@ -32845,7 +32845,7 @@
           </a:ln>
           <a:extLst>
             <a:ext uri="{C572A759-6A51-4108-AA02-DFA0A04FC94B}">
-              <ma14:wrappingTextBoxFlag xmlns:ma14="http://schemas.microsoft.com/office/mac/drawingml/2011/main" xmlns:a14="http://schemas.microsoft.com/office/drawing/2010/main" xmlns:m="http://schemas.openxmlformats.org/officeDocument/2006/math" xmlns="" val="1"/>
+              <ma14:wrappingTextBoxFlag xmlns="" xmlns:m="http://schemas.openxmlformats.org/officeDocument/2006/math" xmlns:a14="http://schemas.microsoft.com/office/drawing/2010/main" xmlns:ma14="http://schemas.microsoft.com/office/mac/drawingml/2011/main" val="1"/>
             </a:ext>
           </a:extLst>
         </p:spPr>
@@ -33380,7 +33380,7 @@
           </a:prstGeom>
           <a:extLst>
             <a:ext uri="{C572A759-6A51-4108-AA02-DFA0A04FC94B}">
-              <ma14:wrappingTextBoxFlag xmlns:ma14="http://schemas.microsoft.com/office/mac/drawingml/2011/main" xmlns:a14="http://schemas.microsoft.com/office/drawing/2010/main" xmlns:m="http://schemas.openxmlformats.org/officeDocument/2006/math" xmlns="" val="1"/>
+              <ma14:wrappingTextBoxFlag xmlns="" xmlns:m="http://schemas.openxmlformats.org/officeDocument/2006/math" xmlns:a14="http://schemas.microsoft.com/office/drawing/2010/main" xmlns:ma14="http://schemas.microsoft.com/office/mac/drawingml/2011/main" val="1"/>
             </a:ext>
           </a:extLst>
         </p:spPr>
@@ -33422,7 +33422,7 @@
           </a:ln>
           <a:extLst>
             <a:ext uri="{C572A759-6A51-4108-AA02-DFA0A04FC94B}">
-              <ma14:wrappingTextBoxFlag xmlns:ma14="http://schemas.microsoft.com/office/mac/drawingml/2011/main" xmlns:a14="http://schemas.microsoft.com/office/drawing/2010/main" xmlns:m="http://schemas.openxmlformats.org/officeDocument/2006/math" xmlns="" val="1"/>
+              <ma14:wrappingTextBoxFlag xmlns="" xmlns:m="http://schemas.openxmlformats.org/officeDocument/2006/math" xmlns:a14="http://schemas.microsoft.com/office/drawing/2010/main" xmlns:ma14="http://schemas.microsoft.com/office/mac/drawingml/2011/main" val="1"/>
             </a:ext>
           </a:extLst>
         </p:spPr>
@@ -33686,7 +33686,7 @@
           </a:ln>
           <a:extLst>
             <a:ext uri="{C572A759-6A51-4108-AA02-DFA0A04FC94B}">
-              <ma14:wrappingTextBoxFlag xmlns="" xmlns:m="http://schemas.openxmlformats.org/officeDocument/2006/math" xmlns:a14="http://schemas.microsoft.com/office/drawing/2010/main" xmlns:ma14="http://schemas.microsoft.com/office/mac/drawingml/2011/main" val="1"/>
+              <ma14:wrappingTextBoxFlag xmlns:ma14="http://schemas.microsoft.com/office/mac/drawingml/2011/main" xmlns:a14="http://schemas.microsoft.com/office/drawing/2010/main" xmlns:m="http://schemas.openxmlformats.org/officeDocument/2006/math" xmlns="" val="1"/>
             </a:ext>
           </a:extLst>
         </p:spPr>
@@ -34146,7 +34146,7 @@
             </a:ln>
             <a:extLst>
               <a:ext uri="{C572A759-6A51-4108-AA02-DFA0A04FC94B}">
-                <ma14:wrappingTextBoxFlag xmlns:ma14="http://schemas.microsoft.com/office/mac/drawingml/2011/main" xmlns:a14="http://schemas.microsoft.com/office/drawing/2010/main" xmlns:m="http://schemas.openxmlformats.org/officeDocument/2006/math" xmlns="" val="1"/>
+                <ma14:wrappingTextBoxFlag xmlns="" xmlns:m="http://schemas.openxmlformats.org/officeDocument/2006/math" xmlns:a14="http://schemas.microsoft.com/office/drawing/2010/main" xmlns:ma14="http://schemas.microsoft.com/office/mac/drawingml/2011/main" val="1"/>
               </a:ext>
             </a:extLst>
           </p:spPr>
@@ -34501,7 +34501,7 @@
           </a:prstGeom>
           <a:extLst>
             <a:ext uri="{C572A759-6A51-4108-AA02-DFA0A04FC94B}">
-              <ma14:wrappingTextBoxFlag xmlns:ma14="http://schemas.microsoft.com/office/mac/drawingml/2011/main" xmlns:a14="http://schemas.microsoft.com/office/drawing/2010/main" xmlns:m="http://schemas.openxmlformats.org/officeDocument/2006/math" xmlns="" val="1"/>
+              <ma14:wrappingTextBoxFlag xmlns="" xmlns:m="http://schemas.openxmlformats.org/officeDocument/2006/math" xmlns:a14="http://schemas.microsoft.com/office/drawing/2010/main" xmlns:ma14="http://schemas.microsoft.com/office/mac/drawingml/2011/main" val="1"/>
             </a:ext>
           </a:extLst>
         </p:spPr>
@@ -34542,7 +34542,7 @@
           </a:ln>
           <a:extLst>
             <a:ext uri="{C572A759-6A51-4108-AA02-DFA0A04FC94B}">
-              <ma14:wrappingTextBoxFlag xmlns:ma14="http://schemas.microsoft.com/office/mac/drawingml/2011/main" xmlns:a14="http://schemas.microsoft.com/office/drawing/2010/main" xmlns:m="http://schemas.openxmlformats.org/officeDocument/2006/math" xmlns="" val="1"/>
+              <ma14:wrappingTextBoxFlag xmlns="" xmlns:m="http://schemas.openxmlformats.org/officeDocument/2006/math" xmlns:a14="http://schemas.microsoft.com/office/drawing/2010/main" xmlns:ma14="http://schemas.microsoft.com/office/mac/drawingml/2011/main" val="1"/>
             </a:ext>
           </a:extLst>
         </p:spPr>
@@ -35387,7 +35387,7 @@
           </a:ln>
           <a:extLst>
             <a:ext uri="{C572A759-6A51-4108-AA02-DFA0A04FC94B}">
-              <ma14:wrappingTextBoxFlag xmlns:ma14="http://schemas.microsoft.com/office/mac/drawingml/2011/main" xmlns:a14="http://schemas.microsoft.com/office/drawing/2010/main" xmlns:m="http://schemas.openxmlformats.org/officeDocument/2006/math" xmlns="" val="1"/>
+              <ma14:wrappingTextBoxFlag xmlns="" xmlns:m="http://schemas.openxmlformats.org/officeDocument/2006/math" xmlns:a14="http://schemas.microsoft.com/office/drawing/2010/main" xmlns:ma14="http://schemas.microsoft.com/office/mac/drawingml/2011/main" val="1"/>
             </a:ext>
           </a:extLst>
         </p:spPr>
@@ -35501,7 +35501,7 @@
           </a:ln>
           <a:extLst>
             <a:ext uri="{C572A759-6A51-4108-AA02-DFA0A04FC94B}">
-              <ma14:wrappingTextBoxFlag xmlns:ma14="http://schemas.microsoft.com/office/mac/drawingml/2011/main" xmlns:a14="http://schemas.microsoft.com/office/drawing/2010/main" xmlns:m="http://schemas.openxmlformats.org/officeDocument/2006/math" xmlns="" val="1"/>
+              <ma14:wrappingTextBoxFlag xmlns="" xmlns:m="http://schemas.openxmlformats.org/officeDocument/2006/math" xmlns:a14="http://schemas.microsoft.com/office/drawing/2010/main" xmlns:ma14="http://schemas.microsoft.com/office/mac/drawingml/2011/main" val="1"/>
             </a:ext>
           </a:extLst>
         </p:spPr>
@@ -35545,7 +35545,7 @@
           </a:ln>
           <a:extLst>
             <a:ext uri="{C572A759-6A51-4108-AA02-DFA0A04FC94B}">
-              <ma14:wrappingTextBoxFlag xmlns:ma14="http://schemas.microsoft.com/office/mac/drawingml/2011/main" xmlns:a14="http://schemas.microsoft.com/office/drawing/2010/main" xmlns:m="http://schemas.openxmlformats.org/officeDocument/2006/math" xmlns="" val="1"/>
+              <ma14:wrappingTextBoxFlag xmlns="" xmlns:m="http://schemas.openxmlformats.org/officeDocument/2006/math" xmlns:a14="http://schemas.microsoft.com/office/drawing/2010/main" xmlns:ma14="http://schemas.microsoft.com/office/mac/drawingml/2011/main" val="1"/>
             </a:ext>
           </a:extLst>
         </p:spPr>
@@ -35610,7 +35610,7 @@
             <a:effectLst/>
             <a:extLst>
               <a:ext uri="{C572A759-6A51-4108-AA02-DFA0A04FC94B}">
-                <ma14:wrappingTextBoxFlag xmlns:ma14="http://schemas.microsoft.com/office/mac/drawingml/2011/main" xmlns:a14="http://schemas.microsoft.com/office/drawing/2010/main" xmlns:m="http://schemas.openxmlformats.org/officeDocument/2006/math" xmlns="" val="1"/>
+                <ma14:wrappingTextBoxFlag xmlns="" xmlns:m="http://schemas.openxmlformats.org/officeDocument/2006/math" xmlns:a14="http://schemas.microsoft.com/office/drawing/2010/main" xmlns:ma14="http://schemas.microsoft.com/office/mac/drawingml/2011/main" val="1"/>
               </a:ext>
             </a:extLst>
           </p:spPr>
@@ -35787,7 +35787,7 @@
             <a:effectLst/>
             <a:extLst>
               <a:ext uri="{C572A759-6A51-4108-AA02-DFA0A04FC94B}">
-                <ma14:wrappingTextBoxFlag xmlns:ma14="http://schemas.microsoft.com/office/mac/drawingml/2011/main" xmlns:a14="http://schemas.microsoft.com/office/drawing/2010/main" xmlns:m="http://schemas.openxmlformats.org/officeDocument/2006/math" xmlns="" val="1"/>
+                <ma14:wrappingTextBoxFlag xmlns="" xmlns:m="http://schemas.openxmlformats.org/officeDocument/2006/math" xmlns:a14="http://schemas.microsoft.com/office/drawing/2010/main" xmlns:ma14="http://schemas.microsoft.com/office/mac/drawingml/2011/main" val="1"/>
               </a:ext>
             </a:extLst>
           </p:spPr>
@@ -37417,7 +37417,7 @@
           </a:prstGeom>
           <a:extLst>
             <a:ext uri="{C572A759-6A51-4108-AA02-DFA0A04FC94B}">
-              <ma14:wrappingTextBoxFlag xmlns:ma14="http://schemas.microsoft.com/office/mac/drawingml/2011/main" xmlns:a14="http://schemas.microsoft.com/office/drawing/2010/main" xmlns:m="http://schemas.openxmlformats.org/officeDocument/2006/math" xmlns="" val="1"/>
+              <ma14:wrappingTextBoxFlag xmlns="" xmlns:m="http://schemas.openxmlformats.org/officeDocument/2006/math" xmlns:a14="http://schemas.microsoft.com/office/drawing/2010/main" xmlns:ma14="http://schemas.microsoft.com/office/mac/drawingml/2011/main" val="1"/>
             </a:ext>
           </a:extLst>
         </p:spPr>
@@ -37511,7 +37511,7 @@
           </a:prstGeom>
           <a:extLst>
             <a:ext uri="{C572A759-6A51-4108-AA02-DFA0A04FC94B}">
-              <ma14:wrappingTextBoxFlag xmlns:ma14="http://schemas.microsoft.com/office/mac/drawingml/2011/main" xmlns:a14="http://schemas.microsoft.com/office/drawing/2010/main" xmlns:m="http://schemas.openxmlformats.org/officeDocument/2006/math" xmlns="" val="1"/>
+              <ma14:wrappingTextBoxFlag xmlns="" xmlns:m="http://schemas.openxmlformats.org/officeDocument/2006/math" xmlns:a14="http://schemas.microsoft.com/office/drawing/2010/main" xmlns:ma14="http://schemas.microsoft.com/office/mac/drawingml/2011/main" val="1"/>
             </a:ext>
           </a:extLst>
         </p:spPr>
@@ -37551,7 +37551,7 @@
           </a:ln>
           <a:extLst>
             <a:ext uri="{C572A759-6A51-4108-AA02-DFA0A04FC94B}">
-              <ma14:wrappingTextBoxFlag xmlns:ma14="http://schemas.microsoft.com/office/mac/drawingml/2011/main" xmlns:a14="http://schemas.microsoft.com/office/drawing/2010/main" xmlns:m="http://schemas.openxmlformats.org/officeDocument/2006/math" xmlns="" val="1"/>
+              <ma14:wrappingTextBoxFlag xmlns="" xmlns:m="http://schemas.openxmlformats.org/officeDocument/2006/math" xmlns:a14="http://schemas.microsoft.com/office/drawing/2010/main" xmlns:ma14="http://schemas.microsoft.com/office/mac/drawingml/2011/main" val="1"/>
             </a:ext>
           </a:extLst>
         </p:spPr>
@@ -38040,7 +38040,7 @@
           </a:ln>
           <a:extLst>
             <a:ext uri="{C572A759-6A51-4108-AA02-DFA0A04FC94B}">
-              <ma14:wrappingTextBoxFlag xmlns:ma14="http://schemas.microsoft.com/office/mac/drawingml/2011/main" xmlns:a14="http://schemas.microsoft.com/office/drawing/2010/main" xmlns:m="http://schemas.openxmlformats.org/officeDocument/2006/math" xmlns="" val="1"/>
+              <ma14:wrappingTextBoxFlag xmlns="" xmlns:m="http://schemas.openxmlformats.org/officeDocument/2006/math" xmlns:a14="http://schemas.microsoft.com/office/drawing/2010/main" xmlns:ma14="http://schemas.microsoft.com/office/mac/drawingml/2011/main" val="1"/>
             </a:ext>
           </a:extLst>
         </p:spPr>
@@ -38639,7 +38639,7 @@
           </a:ln>
           <a:extLst>
             <a:ext uri="{C572A759-6A51-4108-AA02-DFA0A04FC94B}">
-              <ma14:wrappingTextBoxFlag xmlns:ma14="http://schemas.microsoft.com/office/mac/drawingml/2011/main" xmlns:a14="http://schemas.microsoft.com/office/drawing/2010/main" xmlns:m="http://schemas.openxmlformats.org/officeDocument/2006/math" xmlns="" val="1"/>
+              <ma14:wrappingTextBoxFlag xmlns="" xmlns:m="http://schemas.openxmlformats.org/officeDocument/2006/math" xmlns:a14="http://schemas.microsoft.com/office/drawing/2010/main" xmlns:ma14="http://schemas.microsoft.com/office/mac/drawingml/2011/main" val="1"/>
             </a:ext>
           </a:extLst>
         </p:spPr>
@@ -38889,7 +38889,7 @@
           </a:prstGeom>
           <a:extLst>
             <a:ext uri="{C572A759-6A51-4108-AA02-DFA0A04FC94B}">
-              <ma14:wrappingTextBoxFlag xmlns="" xmlns:m="http://schemas.openxmlformats.org/officeDocument/2006/math" xmlns:a14="http://schemas.microsoft.com/office/drawing/2010/main" xmlns:ma14="http://schemas.microsoft.com/office/mac/drawingml/2011/main" val="1"/>
+              <ma14:wrappingTextBoxFlag xmlns:ma14="http://schemas.microsoft.com/office/mac/drawingml/2011/main" xmlns:a14="http://schemas.microsoft.com/office/drawing/2010/main" xmlns:m="http://schemas.openxmlformats.org/officeDocument/2006/math" xmlns="" val="1"/>
             </a:ext>
           </a:extLst>
         </p:spPr>
@@ -39054,7 +39054,7 @@
             <a:effectLst/>
             <a:extLst>
               <a:ext uri="{C572A759-6A51-4108-AA02-DFA0A04FC94B}">
-                <ma14:wrappingTextBoxFlag xmlns="" xmlns:m="http://schemas.openxmlformats.org/officeDocument/2006/math" xmlns:a14="http://schemas.microsoft.com/office/drawing/2010/main" xmlns:ma14="http://schemas.microsoft.com/office/mac/drawingml/2011/main" val="1"/>
+                <ma14:wrappingTextBoxFlag xmlns:ma14="http://schemas.microsoft.com/office/mac/drawingml/2011/main" xmlns:a14="http://schemas.microsoft.com/office/drawing/2010/main" xmlns:m="http://schemas.openxmlformats.org/officeDocument/2006/math" xmlns="" val="1"/>
               </a:ext>
             </a:extLst>
           </p:spPr>
@@ -39185,7 +39185,7 @@
             <a:effectLst/>
             <a:extLst>
               <a:ext uri="{C572A759-6A51-4108-AA02-DFA0A04FC94B}">
-                <ma14:wrappingTextBoxFlag xmlns="" xmlns:m="http://schemas.openxmlformats.org/officeDocument/2006/math" xmlns:a14="http://schemas.microsoft.com/office/drawing/2010/main" xmlns:ma14="http://schemas.microsoft.com/office/mac/drawingml/2011/main" val="1"/>
+                <ma14:wrappingTextBoxFlag xmlns:ma14="http://schemas.microsoft.com/office/mac/drawingml/2011/main" xmlns:a14="http://schemas.microsoft.com/office/drawing/2010/main" xmlns:m="http://schemas.openxmlformats.org/officeDocument/2006/math" xmlns="" val="1"/>
               </a:ext>
             </a:extLst>
           </p:spPr>
@@ -39240,7 +39240,7 @@
           </a:ln>
           <a:extLst>
             <a:ext uri="{C572A759-6A51-4108-AA02-DFA0A04FC94B}">
-              <ma14:wrappingTextBoxFlag xmlns:ma14="http://schemas.microsoft.com/office/mac/drawingml/2011/main" xmlns:a14="http://schemas.microsoft.com/office/drawing/2010/main" xmlns:m="http://schemas.openxmlformats.org/officeDocument/2006/math" xmlns="" val="1"/>
+              <ma14:wrappingTextBoxFlag xmlns="" xmlns:m="http://schemas.openxmlformats.org/officeDocument/2006/math" xmlns:a14="http://schemas.microsoft.com/office/drawing/2010/main" xmlns:ma14="http://schemas.microsoft.com/office/mac/drawingml/2011/main" val="1"/>
             </a:ext>
           </a:extLst>
         </p:spPr>
@@ -39492,7 +39492,7 @@
             <a:effectLst/>
             <a:extLst>
               <a:ext uri="{C572A759-6A51-4108-AA02-DFA0A04FC94B}">
-                <ma14:wrappingTextBoxFlag xmlns="" xmlns:m="http://schemas.openxmlformats.org/officeDocument/2006/math" xmlns:a14="http://schemas.microsoft.com/office/drawing/2010/main" xmlns:ma14="http://schemas.microsoft.com/office/mac/drawingml/2011/main" val="1"/>
+                <ma14:wrappingTextBoxFlag xmlns:ma14="http://schemas.microsoft.com/office/mac/drawingml/2011/main" xmlns:a14="http://schemas.microsoft.com/office/drawing/2010/main" xmlns:m="http://schemas.openxmlformats.org/officeDocument/2006/math" xmlns="" val="1"/>
               </a:ext>
             </a:extLst>
           </p:spPr>
@@ -39619,7 +39619,7 @@
             <a:effectLst/>
             <a:extLst>
               <a:ext uri="{C572A759-6A51-4108-AA02-DFA0A04FC94B}">
-                <ma14:wrappingTextBoxFlag xmlns="" xmlns:m="http://schemas.openxmlformats.org/officeDocument/2006/math" xmlns:a14="http://schemas.microsoft.com/office/drawing/2010/main" xmlns:ma14="http://schemas.microsoft.com/office/mac/drawingml/2011/main" val="1"/>
+                <ma14:wrappingTextBoxFlag xmlns:ma14="http://schemas.microsoft.com/office/mac/drawingml/2011/main" xmlns:a14="http://schemas.microsoft.com/office/drawing/2010/main" xmlns:m="http://schemas.openxmlformats.org/officeDocument/2006/math" xmlns="" val="1"/>
               </a:ext>
             </a:extLst>
           </p:spPr>
@@ -39989,7 +39989,7 @@
           </a:ln>
           <a:extLst>
             <a:ext uri="{C572A759-6A51-4108-AA02-DFA0A04FC94B}">
-              <ma14:wrappingTextBoxFlag xmlns="" xmlns:m="http://schemas.openxmlformats.org/officeDocument/2006/math" xmlns:a14="http://schemas.microsoft.com/office/drawing/2010/main" xmlns:ma14="http://schemas.microsoft.com/office/mac/drawingml/2011/main" val="1"/>
+              <ma14:wrappingTextBoxFlag xmlns:ma14="http://schemas.microsoft.com/office/mac/drawingml/2011/main" xmlns:a14="http://schemas.microsoft.com/office/drawing/2010/main" xmlns:m="http://schemas.openxmlformats.org/officeDocument/2006/math" xmlns="" val="1"/>
             </a:ext>
           </a:extLst>
         </p:spPr>
@@ -40283,7 +40283,7 @@
           </a:ln>
           <a:extLst>
             <a:ext uri="{C572A759-6A51-4108-AA02-DFA0A04FC94B}">
-              <ma14:wrappingTextBoxFlag xmlns="" xmlns:m="http://schemas.openxmlformats.org/officeDocument/2006/math" xmlns:a14="http://schemas.microsoft.com/office/drawing/2010/main" xmlns:ma14="http://schemas.microsoft.com/office/mac/drawingml/2011/main" val="1"/>
+              <ma14:wrappingTextBoxFlag xmlns:ma14="http://schemas.microsoft.com/office/mac/drawingml/2011/main" xmlns:a14="http://schemas.microsoft.com/office/drawing/2010/main" xmlns:m="http://schemas.openxmlformats.org/officeDocument/2006/math" xmlns="" val="1"/>
             </a:ext>
           </a:extLst>
         </p:spPr>
@@ -40778,7 +40778,7 @@
           </a:ln>
           <a:extLst>
             <a:ext uri="{C572A759-6A51-4108-AA02-DFA0A04FC94B}">
-              <ma14:wrappingTextBoxFlag xmlns:ma14="http://schemas.microsoft.com/office/mac/drawingml/2011/main" xmlns:a14="http://schemas.microsoft.com/office/drawing/2010/main" xmlns:m="http://schemas.openxmlformats.org/officeDocument/2006/math" xmlns="" val="1"/>
+              <ma14:wrappingTextBoxFlag xmlns="" xmlns:m="http://schemas.openxmlformats.org/officeDocument/2006/math" xmlns:a14="http://schemas.microsoft.com/office/drawing/2010/main" xmlns:ma14="http://schemas.microsoft.com/office/mac/drawingml/2011/main" val="1"/>
             </a:ext>
           </a:extLst>
         </p:spPr>
@@ -41129,7 +41129,7 @@
           </a:ln>
           <a:extLst>
             <a:ext uri="{C572A759-6A51-4108-AA02-DFA0A04FC94B}">
-              <ma14:wrappingTextBoxFlag xmlns:ma14="http://schemas.microsoft.com/office/mac/drawingml/2011/main" xmlns:a14="http://schemas.microsoft.com/office/drawing/2010/main" xmlns:m="http://schemas.openxmlformats.org/officeDocument/2006/math" xmlns="" val="1"/>
+              <ma14:wrappingTextBoxFlag xmlns="" xmlns:m="http://schemas.openxmlformats.org/officeDocument/2006/math" xmlns:a14="http://schemas.microsoft.com/office/drawing/2010/main" xmlns:ma14="http://schemas.microsoft.com/office/mac/drawingml/2011/main" val="1"/>
             </a:ext>
           </a:extLst>
         </p:spPr>
@@ -41805,7 +41805,7 @@
             <a:effectLst/>
             <a:extLst>
               <a:ext uri="{C572A759-6A51-4108-AA02-DFA0A04FC94B}">
-                <ma14:wrappingTextBoxFlag xmlns="" xmlns:m="http://schemas.openxmlformats.org/officeDocument/2006/math" xmlns:a14="http://schemas.microsoft.com/office/drawing/2010/main" xmlns:ma14="http://schemas.microsoft.com/office/mac/drawingml/2011/main" val="1"/>
+                <ma14:wrappingTextBoxFlag xmlns:ma14="http://schemas.microsoft.com/office/mac/drawingml/2011/main" xmlns:a14="http://schemas.microsoft.com/office/drawing/2010/main" xmlns:m="http://schemas.openxmlformats.org/officeDocument/2006/math" xmlns="" val="1"/>
               </a:ext>
             </a:extLst>
           </p:spPr>
@@ -41874,7 +41874,7 @@
             <a:effectLst/>
             <a:extLst>
               <a:ext uri="{C572A759-6A51-4108-AA02-DFA0A04FC94B}">
-                <ma14:wrappingTextBoxFlag xmlns="" xmlns:m="http://schemas.openxmlformats.org/officeDocument/2006/math" xmlns:a14="http://schemas.microsoft.com/office/drawing/2010/main" xmlns:ma14="http://schemas.microsoft.com/office/mac/drawingml/2011/main" val="1"/>
+                <ma14:wrappingTextBoxFlag xmlns:ma14="http://schemas.microsoft.com/office/mac/drawingml/2011/main" xmlns:a14="http://schemas.microsoft.com/office/drawing/2010/main" xmlns:m="http://schemas.openxmlformats.org/officeDocument/2006/math" xmlns="" val="1"/>
               </a:ext>
             </a:extLst>
           </p:spPr>
@@ -41940,7 +41940,7 @@
             </a:ln>
             <a:extLst>
               <a:ext uri="{C572A759-6A51-4108-AA02-DFA0A04FC94B}">
-                <ma14:wrappingTextBoxFlag xmlns="" xmlns:m="http://schemas.openxmlformats.org/officeDocument/2006/math" xmlns:a14="http://schemas.microsoft.com/office/drawing/2010/main" xmlns:ma14="http://schemas.microsoft.com/office/mac/drawingml/2011/main" val="1"/>
+                <ma14:wrappingTextBoxFlag xmlns:ma14="http://schemas.microsoft.com/office/mac/drawingml/2011/main" xmlns:a14="http://schemas.microsoft.com/office/drawing/2010/main" xmlns:m="http://schemas.openxmlformats.org/officeDocument/2006/math" xmlns="" val="1"/>
               </a:ext>
             </a:extLst>
           </p:spPr>
@@ -41998,7 +41998,7 @@
             </a:ln>
             <a:extLst>
               <a:ext uri="{C572A759-6A51-4108-AA02-DFA0A04FC94B}">
-                <ma14:wrappingTextBoxFlag xmlns="" xmlns:m="http://schemas.openxmlformats.org/officeDocument/2006/math" xmlns:a14="http://schemas.microsoft.com/office/drawing/2010/main" xmlns:ma14="http://schemas.microsoft.com/office/mac/drawingml/2011/main" val="1"/>
+                <ma14:wrappingTextBoxFlag xmlns:ma14="http://schemas.microsoft.com/office/mac/drawingml/2011/main" xmlns:a14="http://schemas.microsoft.com/office/drawing/2010/main" xmlns:m="http://schemas.openxmlformats.org/officeDocument/2006/math" xmlns="" val="1"/>
               </a:ext>
             </a:extLst>
           </p:spPr>
@@ -42079,7 +42079,7 @@
             <a:effectLst/>
             <a:extLst>
               <a:ext uri="{C572A759-6A51-4108-AA02-DFA0A04FC94B}">
-                <ma14:wrappingTextBoxFlag xmlns="" xmlns:m="http://schemas.openxmlformats.org/officeDocument/2006/math" xmlns:a14="http://schemas.microsoft.com/office/drawing/2010/main" xmlns:ma14="http://schemas.microsoft.com/office/mac/drawingml/2011/main" val="1"/>
+                <ma14:wrappingTextBoxFlag xmlns:ma14="http://schemas.microsoft.com/office/mac/drawingml/2011/main" xmlns:a14="http://schemas.microsoft.com/office/drawing/2010/main" xmlns:m="http://schemas.openxmlformats.org/officeDocument/2006/math" xmlns="" val="1"/>
               </a:ext>
             </a:extLst>
           </p:spPr>
@@ -42152,7 +42152,7 @@
             <a:effectLst/>
             <a:extLst>
               <a:ext uri="{C572A759-6A51-4108-AA02-DFA0A04FC94B}">
-                <ma14:wrappingTextBoxFlag xmlns="" xmlns:m="http://schemas.openxmlformats.org/officeDocument/2006/math" xmlns:a14="http://schemas.microsoft.com/office/drawing/2010/main" xmlns:ma14="http://schemas.microsoft.com/office/mac/drawingml/2011/main" val="1"/>
+                <ma14:wrappingTextBoxFlag xmlns:ma14="http://schemas.microsoft.com/office/mac/drawingml/2011/main" xmlns:a14="http://schemas.microsoft.com/office/drawing/2010/main" xmlns:m="http://schemas.openxmlformats.org/officeDocument/2006/math" xmlns="" val="1"/>
               </a:ext>
             </a:extLst>
           </p:spPr>
@@ -42218,7 +42218,7 @@
             </a:ln>
             <a:extLst>
               <a:ext uri="{C572A759-6A51-4108-AA02-DFA0A04FC94B}">
-                <ma14:wrappingTextBoxFlag xmlns="" xmlns:m="http://schemas.openxmlformats.org/officeDocument/2006/math" xmlns:a14="http://schemas.microsoft.com/office/drawing/2010/main" xmlns:ma14="http://schemas.microsoft.com/office/mac/drawingml/2011/main" val="1"/>
+                <ma14:wrappingTextBoxFlag xmlns:ma14="http://schemas.microsoft.com/office/mac/drawingml/2011/main" xmlns:a14="http://schemas.microsoft.com/office/drawing/2010/main" xmlns:m="http://schemas.openxmlformats.org/officeDocument/2006/math" xmlns="" val="1"/>
               </a:ext>
             </a:extLst>
           </p:spPr>
@@ -42276,7 +42276,7 @@
             </a:ln>
             <a:extLst>
               <a:ext uri="{C572A759-6A51-4108-AA02-DFA0A04FC94B}">
-                <ma14:wrappingTextBoxFlag xmlns="" xmlns:m="http://schemas.openxmlformats.org/officeDocument/2006/math" xmlns:a14="http://schemas.microsoft.com/office/drawing/2010/main" xmlns:ma14="http://schemas.microsoft.com/office/mac/drawingml/2011/main" val="1"/>
+                <ma14:wrappingTextBoxFlag xmlns:ma14="http://schemas.microsoft.com/office/mac/drawingml/2011/main" xmlns:a14="http://schemas.microsoft.com/office/drawing/2010/main" xmlns:m="http://schemas.openxmlformats.org/officeDocument/2006/math" xmlns="" val="1"/>
               </a:ext>
             </a:extLst>
           </p:spPr>
@@ -42357,7 +42357,7 @@
             <a:effectLst/>
             <a:extLst>
               <a:ext uri="{C572A759-6A51-4108-AA02-DFA0A04FC94B}">
-                <ma14:wrappingTextBoxFlag xmlns="" xmlns:m="http://schemas.openxmlformats.org/officeDocument/2006/math" xmlns:a14="http://schemas.microsoft.com/office/drawing/2010/main" xmlns:ma14="http://schemas.microsoft.com/office/mac/drawingml/2011/main" val="1"/>
+                <ma14:wrappingTextBoxFlag xmlns:ma14="http://schemas.microsoft.com/office/mac/drawingml/2011/main" xmlns:a14="http://schemas.microsoft.com/office/drawing/2010/main" xmlns:m="http://schemas.openxmlformats.org/officeDocument/2006/math" xmlns="" val="1"/>
               </a:ext>
             </a:extLst>
           </p:spPr>
@@ -42430,7 +42430,7 @@
             <a:effectLst/>
             <a:extLst>
               <a:ext uri="{C572A759-6A51-4108-AA02-DFA0A04FC94B}">
-                <ma14:wrappingTextBoxFlag xmlns="" xmlns:m="http://schemas.openxmlformats.org/officeDocument/2006/math" xmlns:a14="http://schemas.microsoft.com/office/drawing/2010/main" xmlns:ma14="http://schemas.microsoft.com/office/mac/drawingml/2011/main" val="1"/>
+                <ma14:wrappingTextBoxFlag xmlns:ma14="http://schemas.microsoft.com/office/mac/drawingml/2011/main" xmlns:a14="http://schemas.microsoft.com/office/drawing/2010/main" xmlns:m="http://schemas.openxmlformats.org/officeDocument/2006/math" xmlns="" val="1"/>
               </a:ext>
             </a:extLst>
           </p:spPr>
@@ -42496,7 +42496,7 @@
             </a:ln>
             <a:extLst>
               <a:ext uri="{C572A759-6A51-4108-AA02-DFA0A04FC94B}">
-                <ma14:wrappingTextBoxFlag xmlns="" xmlns:m="http://schemas.openxmlformats.org/officeDocument/2006/math" xmlns:a14="http://schemas.microsoft.com/office/drawing/2010/main" xmlns:ma14="http://schemas.microsoft.com/office/mac/drawingml/2011/main" val="1"/>
+                <ma14:wrappingTextBoxFlag xmlns:ma14="http://schemas.microsoft.com/office/mac/drawingml/2011/main" xmlns:a14="http://schemas.microsoft.com/office/drawing/2010/main" xmlns:m="http://schemas.openxmlformats.org/officeDocument/2006/math" xmlns="" val="1"/>
               </a:ext>
             </a:extLst>
           </p:spPr>
@@ -42554,7 +42554,7 @@
             </a:ln>
             <a:extLst>
               <a:ext uri="{C572A759-6A51-4108-AA02-DFA0A04FC94B}">
-                <ma14:wrappingTextBoxFlag xmlns="" xmlns:m="http://schemas.openxmlformats.org/officeDocument/2006/math" xmlns:a14="http://schemas.microsoft.com/office/drawing/2010/main" xmlns:ma14="http://schemas.microsoft.com/office/mac/drawingml/2011/main" val="1"/>
+                <ma14:wrappingTextBoxFlag xmlns:ma14="http://schemas.microsoft.com/office/mac/drawingml/2011/main" xmlns:a14="http://schemas.microsoft.com/office/drawing/2010/main" xmlns:m="http://schemas.openxmlformats.org/officeDocument/2006/math" xmlns="" val="1"/>
               </a:ext>
             </a:extLst>
           </p:spPr>
@@ -42635,7 +42635,7 @@
             <a:effectLst/>
             <a:extLst>
               <a:ext uri="{C572A759-6A51-4108-AA02-DFA0A04FC94B}">
-                <ma14:wrappingTextBoxFlag xmlns="" xmlns:m="http://schemas.openxmlformats.org/officeDocument/2006/math" xmlns:a14="http://schemas.microsoft.com/office/drawing/2010/main" xmlns:ma14="http://schemas.microsoft.com/office/mac/drawingml/2011/main" val="1"/>
+                <ma14:wrappingTextBoxFlag xmlns:ma14="http://schemas.microsoft.com/office/mac/drawingml/2011/main" xmlns:a14="http://schemas.microsoft.com/office/drawing/2010/main" xmlns:m="http://schemas.openxmlformats.org/officeDocument/2006/math" xmlns="" val="1"/>
               </a:ext>
             </a:extLst>
           </p:spPr>
@@ -42704,7 +42704,7 @@
             <a:effectLst/>
             <a:extLst>
               <a:ext uri="{C572A759-6A51-4108-AA02-DFA0A04FC94B}">
-                <ma14:wrappingTextBoxFlag xmlns="" xmlns:m="http://schemas.openxmlformats.org/officeDocument/2006/math" xmlns:a14="http://schemas.microsoft.com/office/drawing/2010/main" xmlns:ma14="http://schemas.microsoft.com/office/mac/drawingml/2011/main" val="1"/>
+                <ma14:wrappingTextBoxFlag xmlns:ma14="http://schemas.microsoft.com/office/mac/drawingml/2011/main" xmlns:a14="http://schemas.microsoft.com/office/drawing/2010/main" xmlns:m="http://schemas.openxmlformats.org/officeDocument/2006/math" xmlns="" val="1"/>
               </a:ext>
             </a:extLst>
           </p:spPr>
@@ -42770,7 +42770,7 @@
             </a:ln>
             <a:extLst>
               <a:ext uri="{C572A759-6A51-4108-AA02-DFA0A04FC94B}">
-                <ma14:wrappingTextBoxFlag xmlns="" xmlns:m="http://schemas.openxmlformats.org/officeDocument/2006/math" xmlns:a14="http://schemas.microsoft.com/office/drawing/2010/main" xmlns:ma14="http://schemas.microsoft.com/office/mac/drawingml/2011/main" val="1"/>
+                <ma14:wrappingTextBoxFlag xmlns:ma14="http://schemas.microsoft.com/office/mac/drawingml/2011/main" xmlns:a14="http://schemas.microsoft.com/office/drawing/2010/main" xmlns:m="http://schemas.openxmlformats.org/officeDocument/2006/math" xmlns="" val="1"/>
               </a:ext>
             </a:extLst>
           </p:spPr>
@@ -42828,7 +42828,7 @@
             </a:ln>
             <a:extLst>
               <a:ext uri="{C572A759-6A51-4108-AA02-DFA0A04FC94B}">
-                <ma14:wrappingTextBoxFlag xmlns="" xmlns:m="http://schemas.openxmlformats.org/officeDocument/2006/math" xmlns:a14="http://schemas.microsoft.com/office/drawing/2010/main" xmlns:ma14="http://schemas.microsoft.com/office/mac/drawingml/2011/main" val="1"/>
+                <ma14:wrappingTextBoxFlag xmlns:ma14="http://schemas.microsoft.com/office/mac/drawingml/2011/main" xmlns:a14="http://schemas.microsoft.com/office/drawing/2010/main" xmlns:m="http://schemas.openxmlformats.org/officeDocument/2006/math" xmlns="" val="1"/>
               </a:ext>
             </a:extLst>
           </p:spPr>
@@ -42909,7 +42909,7 @@
             <a:effectLst/>
             <a:extLst>
               <a:ext uri="{C572A759-6A51-4108-AA02-DFA0A04FC94B}">
-                <ma14:wrappingTextBoxFlag xmlns="" xmlns:m="http://schemas.openxmlformats.org/officeDocument/2006/math" xmlns:a14="http://schemas.microsoft.com/office/drawing/2010/main" xmlns:ma14="http://schemas.microsoft.com/office/mac/drawingml/2011/main" val="1"/>
+                <ma14:wrappingTextBoxFlag xmlns:ma14="http://schemas.microsoft.com/office/mac/drawingml/2011/main" xmlns:a14="http://schemas.microsoft.com/office/drawing/2010/main" xmlns:m="http://schemas.openxmlformats.org/officeDocument/2006/math" xmlns="" val="1"/>
               </a:ext>
             </a:extLst>
           </p:spPr>
@@ -42982,7 +42982,7 @@
             <a:effectLst/>
             <a:extLst>
               <a:ext uri="{C572A759-6A51-4108-AA02-DFA0A04FC94B}">
-                <ma14:wrappingTextBoxFlag xmlns="" xmlns:m="http://schemas.openxmlformats.org/officeDocument/2006/math" xmlns:a14="http://schemas.microsoft.com/office/drawing/2010/main" xmlns:ma14="http://schemas.microsoft.com/office/mac/drawingml/2011/main" val="1"/>
+                <ma14:wrappingTextBoxFlag xmlns:ma14="http://schemas.microsoft.com/office/mac/drawingml/2011/main" xmlns:a14="http://schemas.microsoft.com/office/drawing/2010/main" xmlns:m="http://schemas.openxmlformats.org/officeDocument/2006/math" xmlns="" val="1"/>
               </a:ext>
             </a:extLst>
           </p:spPr>
@@ -43048,7 +43048,7 @@
             </a:ln>
             <a:extLst>
               <a:ext uri="{C572A759-6A51-4108-AA02-DFA0A04FC94B}">
-                <ma14:wrappingTextBoxFlag xmlns="" xmlns:m="http://schemas.openxmlformats.org/officeDocument/2006/math" xmlns:a14="http://schemas.microsoft.com/office/drawing/2010/main" xmlns:ma14="http://schemas.microsoft.com/office/mac/drawingml/2011/main" val="1"/>
+                <ma14:wrappingTextBoxFlag xmlns:ma14="http://schemas.microsoft.com/office/mac/drawingml/2011/main" xmlns:a14="http://schemas.microsoft.com/office/drawing/2010/main" xmlns:m="http://schemas.openxmlformats.org/officeDocument/2006/math" xmlns="" val="1"/>
               </a:ext>
             </a:extLst>
           </p:spPr>
@@ -43106,7 +43106,7 @@
             </a:ln>
             <a:extLst>
               <a:ext uri="{C572A759-6A51-4108-AA02-DFA0A04FC94B}">
-                <ma14:wrappingTextBoxFlag xmlns="" xmlns:m="http://schemas.openxmlformats.org/officeDocument/2006/math" xmlns:a14="http://schemas.microsoft.com/office/drawing/2010/main" xmlns:ma14="http://schemas.microsoft.com/office/mac/drawingml/2011/main" val="1"/>
+                <ma14:wrappingTextBoxFlag xmlns:ma14="http://schemas.microsoft.com/office/mac/drawingml/2011/main" xmlns:a14="http://schemas.microsoft.com/office/drawing/2010/main" xmlns:m="http://schemas.openxmlformats.org/officeDocument/2006/math" xmlns="" val="1"/>
               </a:ext>
             </a:extLst>
           </p:spPr>
@@ -43187,7 +43187,7 @@
             <a:effectLst/>
             <a:extLst>
               <a:ext uri="{C572A759-6A51-4108-AA02-DFA0A04FC94B}">
-                <ma14:wrappingTextBoxFlag xmlns="" xmlns:m="http://schemas.openxmlformats.org/officeDocument/2006/math" xmlns:a14="http://schemas.microsoft.com/office/drawing/2010/main" xmlns:ma14="http://schemas.microsoft.com/office/mac/drawingml/2011/main" val="1"/>
+                <ma14:wrappingTextBoxFlag xmlns:ma14="http://schemas.microsoft.com/office/mac/drawingml/2011/main" xmlns:a14="http://schemas.microsoft.com/office/drawing/2010/main" xmlns:m="http://schemas.openxmlformats.org/officeDocument/2006/math" xmlns="" val="1"/>
               </a:ext>
             </a:extLst>
           </p:spPr>
@@ -43260,7 +43260,7 @@
             <a:effectLst/>
             <a:extLst>
               <a:ext uri="{C572A759-6A51-4108-AA02-DFA0A04FC94B}">
-                <ma14:wrappingTextBoxFlag xmlns="" xmlns:m="http://schemas.openxmlformats.org/officeDocument/2006/math" xmlns:a14="http://schemas.microsoft.com/office/drawing/2010/main" xmlns:ma14="http://schemas.microsoft.com/office/mac/drawingml/2011/main" val="1"/>
+                <ma14:wrappingTextBoxFlag xmlns:ma14="http://schemas.microsoft.com/office/mac/drawingml/2011/main" xmlns:a14="http://schemas.microsoft.com/office/drawing/2010/main" xmlns:m="http://schemas.openxmlformats.org/officeDocument/2006/math" xmlns="" val="1"/>
               </a:ext>
             </a:extLst>
           </p:spPr>
@@ -43326,7 +43326,7 @@
             </a:ln>
             <a:extLst>
               <a:ext uri="{C572A759-6A51-4108-AA02-DFA0A04FC94B}">
-                <ma14:wrappingTextBoxFlag xmlns="" xmlns:m="http://schemas.openxmlformats.org/officeDocument/2006/math" xmlns:a14="http://schemas.microsoft.com/office/drawing/2010/main" xmlns:ma14="http://schemas.microsoft.com/office/mac/drawingml/2011/main" val="1"/>
+                <ma14:wrappingTextBoxFlag xmlns:ma14="http://schemas.microsoft.com/office/mac/drawingml/2011/main" xmlns:a14="http://schemas.microsoft.com/office/drawing/2010/main" xmlns:m="http://schemas.openxmlformats.org/officeDocument/2006/math" xmlns="" val="1"/>
               </a:ext>
             </a:extLst>
           </p:spPr>
@@ -43384,7 +43384,7 @@
             </a:ln>
             <a:extLst>
               <a:ext uri="{C572A759-6A51-4108-AA02-DFA0A04FC94B}">
-                <ma14:wrappingTextBoxFlag xmlns="" xmlns:m="http://schemas.openxmlformats.org/officeDocument/2006/math" xmlns:a14="http://schemas.microsoft.com/office/drawing/2010/main" xmlns:ma14="http://schemas.microsoft.com/office/mac/drawingml/2011/main" val="1"/>
+                <ma14:wrappingTextBoxFlag xmlns:ma14="http://schemas.microsoft.com/office/mac/drawingml/2011/main" xmlns:a14="http://schemas.microsoft.com/office/drawing/2010/main" xmlns:m="http://schemas.openxmlformats.org/officeDocument/2006/math" xmlns="" val="1"/>
               </a:ext>
             </a:extLst>
           </p:spPr>
@@ -43443,7 +43443,7 @@
           </a:ln>
           <a:extLst>
             <a:ext uri="{C572A759-6A51-4108-AA02-DFA0A04FC94B}">
-              <ma14:wrappingTextBoxFlag xmlns="" xmlns:m="http://schemas.openxmlformats.org/officeDocument/2006/math" xmlns:a14="http://schemas.microsoft.com/office/drawing/2010/main" xmlns:ma14="http://schemas.microsoft.com/office/mac/drawingml/2011/main" val="1"/>
+              <ma14:wrappingTextBoxFlag xmlns:ma14="http://schemas.microsoft.com/office/mac/drawingml/2011/main" xmlns:a14="http://schemas.microsoft.com/office/drawing/2010/main" xmlns:m="http://schemas.openxmlformats.org/officeDocument/2006/math" xmlns="" val="1"/>
             </a:ext>
           </a:extLst>
         </p:spPr>
@@ -43501,7 +43501,7 @@
           </a:ln>
           <a:extLst>
             <a:ext uri="{C572A759-6A51-4108-AA02-DFA0A04FC94B}">
-              <ma14:wrappingTextBoxFlag xmlns="" xmlns:m="http://schemas.openxmlformats.org/officeDocument/2006/math" xmlns:a14="http://schemas.microsoft.com/office/drawing/2010/main" xmlns:ma14="http://schemas.microsoft.com/office/mac/drawingml/2011/main" val="1"/>
+              <ma14:wrappingTextBoxFlag xmlns:ma14="http://schemas.microsoft.com/office/mac/drawingml/2011/main" xmlns:a14="http://schemas.microsoft.com/office/drawing/2010/main" xmlns:m="http://schemas.openxmlformats.org/officeDocument/2006/math" xmlns="" val="1"/>
             </a:ext>
           </a:extLst>
         </p:spPr>

</xml_diff>